<commit_message>
Arrived up to slide 16 (not included)
</commit_message>
<xml_diff>
--- a/Project presentation (presentation)- zhiying.pptx
+++ b/Project presentation (presentation)- zhiying.pptx
@@ -288,7 +288,7 @@
           <a:p>
             <a:fld id="{08E547F7-70C5-4547-A4AE-C43BB740706B}" type="datetimeFigureOut">
               <a:rPr lang="en-GB" smtClean="0"/>
-              <a:t>14/10/2017</a:t>
+              <a:t>16/10/2017</a:t>
             </a:fld>
             <a:endParaRPr lang="en-GB"/>
           </a:p>
@@ -454,7 +454,7 @@
           <a:p>
             <a:fld id="{35D16BFF-E995-4642-B57B-66CC9E10AD5D}" type="datetimeFigureOut">
               <a:rPr lang="en-GB" smtClean="0"/>
-              <a:t>14/10/2017</a:t>
+              <a:t>16/10/2017</a:t>
             </a:fld>
             <a:endParaRPr lang="en-GB"/>
           </a:p>
@@ -854,7 +854,7 @@
           <a:p>
             <a:fld id="{D7A2DC60-7AAB-4447-96F0-2D53A29BCED7}" type="datetime1">
               <a:rPr lang="en-GB" smtClean="0"/>
-              <a:t>14/10/2017</a:t>
+              <a:t>16/10/2017</a:t>
             </a:fld>
             <a:endParaRPr lang="en-GB"/>
           </a:p>
@@ -1024,7 +1024,7 @@
           <a:p>
             <a:fld id="{45425B41-1259-416A-9201-2D081FB3DA44}" type="datetime1">
               <a:rPr lang="en-GB" smtClean="0"/>
-              <a:t>14/10/2017</a:t>
+              <a:t>16/10/2017</a:t>
             </a:fld>
             <a:endParaRPr lang="en-GB"/>
           </a:p>
@@ -1204,7 +1204,7 @@
           <a:p>
             <a:fld id="{E86FFA46-90CE-430D-B788-6D5F590585DE}" type="datetime1">
               <a:rPr lang="en-GB" smtClean="0"/>
-              <a:t>14/10/2017</a:t>
+              <a:t>16/10/2017</a:t>
             </a:fld>
             <a:endParaRPr lang="en-GB"/>
           </a:p>
@@ -1374,7 +1374,7 @@
           <a:p>
             <a:fld id="{30357778-D470-41BA-B7AA-A739B8CD456F}" type="datetime1">
               <a:rPr lang="en-GB" smtClean="0"/>
-              <a:t>14/10/2017</a:t>
+              <a:t>16/10/2017</a:t>
             </a:fld>
             <a:endParaRPr lang="en-GB"/>
           </a:p>
@@ -1620,7 +1620,7 @@
           <a:p>
             <a:fld id="{F39CD7CD-50E9-452E-9434-4D15B6C1C393}" type="datetime1">
               <a:rPr lang="en-GB" smtClean="0"/>
-              <a:t>14/10/2017</a:t>
+              <a:t>16/10/2017</a:t>
             </a:fld>
             <a:endParaRPr lang="en-GB"/>
           </a:p>
@@ -1852,7 +1852,7 @@
           <a:p>
             <a:fld id="{F143386D-EBCE-4EE9-B5A2-D503FA6DC607}" type="datetime1">
               <a:rPr lang="en-GB" smtClean="0"/>
-              <a:t>14/10/2017</a:t>
+              <a:t>16/10/2017</a:t>
             </a:fld>
             <a:endParaRPr lang="en-GB"/>
           </a:p>
@@ -2224,7 +2224,7 @@
           <a:p>
             <a:fld id="{117B2199-D56A-49CA-B76E-8278B7A2BCCF}" type="datetime1">
               <a:rPr lang="en-GB" smtClean="0"/>
-              <a:t>14/10/2017</a:t>
+              <a:t>16/10/2017</a:t>
             </a:fld>
             <a:endParaRPr lang="en-GB"/>
           </a:p>
@@ -2347,7 +2347,7 @@
           <a:p>
             <a:fld id="{00979C6E-1826-4945-9E39-555E9E9F1028}" type="datetime1">
               <a:rPr lang="en-GB" smtClean="0"/>
-              <a:t>14/10/2017</a:t>
+              <a:t>16/10/2017</a:t>
             </a:fld>
             <a:endParaRPr lang="en-GB"/>
           </a:p>
@@ -2442,7 +2442,7 @@
           <a:p>
             <a:fld id="{463E3535-1057-4B43-91F6-C4CEB62CF370}" type="datetime1">
               <a:rPr lang="en-GB" smtClean="0"/>
-              <a:t>14/10/2017</a:t>
+              <a:t>16/10/2017</a:t>
             </a:fld>
             <a:endParaRPr lang="en-GB"/>
           </a:p>
@@ -2719,7 +2719,7 @@
           <a:p>
             <a:fld id="{90057F50-AF40-4C7E-B3B6-020F0638C2AB}" type="datetime1">
               <a:rPr lang="en-GB" smtClean="0"/>
-              <a:t>14/10/2017</a:t>
+              <a:t>16/10/2017</a:t>
             </a:fld>
             <a:endParaRPr lang="en-GB"/>
           </a:p>
@@ -2977,7 +2977,7 @@
           <a:p>
             <a:fld id="{9F94FFAD-9F2C-41BC-922F-B2C238348111}" type="datetime1">
               <a:rPr lang="en-GB" smtClean="0"/>
-              <a:t>14/10/2017</a:t>
+              <a:t>16/10/2017</a:t>
             </a:fld>
             <a:endParaRPr lang="en-GB"/>
           </a:p>
@@ -3190,7 +3190,7 @@
           <a:p>
             <a:fld id="{31A5F5B5-A28D-4B96-B86E-E4E1CB16FF9D}" type="datetime1">
               <a:rPr lang="en-GB" smtClean="0"/>
-              <a:t>14/10/2017</a:t>
+              <a:t>16/10/2017</a:t>
             </a:fld>
             <a:endParaRPr lang="en-GB"/>
           </a:p>
@@ -3721,7 +3721,7 @@
           <p:cNvPr id="2" name="Title 1">
             <a:extLst>
               <a:ext uri="{FF2B5EF4-FFF2-40B4-BE49-F238E27FC236}">
-                <a16:creationId xmlns:a16="http://schemas.microsoft.com/office/drawing/2014/main" id="{F93F2032-B71D-4841-88BD-3F15D97A3F28}"/>
+                <a16:creationId xmlns:a16="http://schemas.microsoft.com/office/drawing/2014/main" xmlns="" id="{F93F2032-B71D-4841-88BD-3F15D97A3F28}"/>
               </a:ext>
             </a:extLst>
           </p:cNvPr>
@@ -3746,7 +3746,15 @@
           <a:p>
             <a:r>
               <a:rPr lang="en-GB" b="1" dirty="0"/>
-              <a:t>Main steps of this project:</a:t>
+              <a:t>Main steps </a:t>
+            </a:r>
+            <a:r>
+              <a:rPr lang="en-GB" b="1" dirty="0" smtClean="0"/>
+              <a:t>taken in this </a:t>
+            </a:r>
+            <a:r>
+              <a:rPr lang="en-GB" b="1" dirty="0"/>
+              <a:t>project:</a:t>
             </a:r>
           </a:p>
         </p:txBody>
@@ -3756,7 +3764,7 @@
           <p:cNvPr id="3" name="Content Placeholder 2">
             <a:extLst>
               <a:ext uri="{FF2B5EF4-FFF2-40B4-BE49-F238E27FC236}">
-                <a16:creationId xmlns:a16="http://schemas.microsoft.com/office/drawing/2014/main" id="{600B8653-BB78-4B00-B601-40FEC2BB096F}"/>
+                <a16:creationId xmlns:a16="http://schemas.microsoft.com/office/drawing/2014/main" xmlns="" id="{600B8653-BB78-4B00-B601-40FEC2BB096F}"/>
               </a:ext>
             </a:extLst>
           </p:cNvPr>
@@ -3784,7 +3792,15 @@
             </a:pPr>
             <a:r>
               <a:rPr lang="en-GB" dirty="0"/>
-              <a:t>1. Pre-process of the datasets. Clean the dataset, remove the useless columns or rows; and</a:t>
+              <a:t>1. Pre-process of the datasets. Clean the dataset, remove the </a:t>
+            </a:r>
+            <a:r>
+              <a:rPr lang="en-GB" dirty="0" smtClean="0"/>
+              <a:t>not meaningful columns </a:t>
+            </a:r>
+            <a:r>
+              <a:rPr lang="en-GB" dirty="0"/>
+              <a:t>or rows; and</a:t>
             </a:r>
           </a:p>
           <a:p>
@@ -3793,7 +3809,19 @@
             </a:pPr>
             <a:r>
               <a:rPr lang="en-GB" dirty="0"/>
-              <a:t>2. Explore the datasets. Explore the distribution of the datasets in different features: gender, nationality, grade, topic, parental satisfaction etc. (like girls raises more hand, more discussions in high school etc.); and</a:t>
+              <a:t>2. Explore the datasets. Explore the distribution of the datasets </a:t>
+            </a:r>
+            <a:r>
+              <a:rPr lang="en-GB" dirty="0" err="1" smtClean="0"/>
+              <a:t>w.r.t</a:t>
+            </a:r>
+            <a:r>
+              <a:rPr lang="en-GB" dirty="0" smtClean="0"/>
+              <a:t>. different </a:t>
+            </a:r>
+            <a:r>
+              <a:rPr lang="en-GB" dirty="0"/>
+              <a:t>features: gender, nationality, grade, topic, parental satisfaction etc. (like girls raises more hand, more discussions in high school etc.); and</a:t>
             </a:r>
           </a:p>
           <a:p>
@@ -3802,7 +3830,31 @@
             </a:pPr>
             <a:r>
               <a:rPr lang="en-GB" dirty="0"/>
-              <a:t>3. Find underlying relationships. Like parent who are not satisfied and not answer survey, connection with study activity and performance (raising hand, discussion, absence, parental satisfaction, answering survey etc.); and</a:t>
+              <a:t>3. Find underlying </a:t>
+            </a:r>
+            <a:r>
+              <a:rPr lang="en-GB" dirty="0" smtClean="0"/>
+              <a:t>relationships: e.g., parents </a:t>
+            </a:r>
+            <a:r>
+              <a:rPr lang="en-GB" dirty="0"/>
+              <a:t>who are not satisfied and </a:t>
+            </a:r>
+            <a:r>
+              <a:rPr lang="en-GB" dirty="0" smtClean="0"/>
+              <a:t>do not </a:t>
+            </a:r>
+            <a:r>
+              <a:rPr lang="en-GB" dirty="0"/>
+              <a:t>answer </a:t>
+            </a:r>
+            <a:r>
+              <a:rPr lang="en-GB" dirty="0" smtClean="0"/>
+              <a:t>surveys, </a:t>
+            </a:r>
+            <a:r>
+              <a:rPr lang="en-GB" dirty="0"/>
+              <a:t>connection with study activity and performance (raising hand, discussion, absence, parental satisfaction, answering survey etc.); and</a:t>
             </a:r>
           </a:p>
           <a:p>
@@ -3811,7 +3863,23 @@
             </a:pPr>
             <a:r>
               <a:rPr lang="en-GB" dirty="0"/>
-              <a:t>4. Build prediction model, like decision tree or regression model to predict the student’s academic performance.</a:t>
+              <a:t>4. Build prediction model, </a:t>
+            </a:r>
+            <a:r>
+              <a:rPr lang="en-GB" dirty="0" smtClean="0"/>
+              <a:t>e.g. decision </a:t>
+            </a:r>
+            <a:r>
+              <a:rPr lang="en-GB" dirty="0"/>
+              <a:t>tree or regression </a:t>
+            </a:r>
+            <a:r>
+              <a:rPr lang="en-GB" dirty="0" smtClean="0"/>
+              <a:t>model, </a:t>
+            </a:r>
+            <a:r>
+              <a:rPr lang="en-GB" dirty="0"/>
+              <a:t>to predict the student’s academic performance.</a:t>
             </a:r>
           </a:p>
           <a:p>
@@ -3820,7 +3888,23 @@
             </a:pPr>
             <a:r>
               <a:rPr lang="en-GB" dirty="0"/>
-              <a:t>5. Evaluate the predictive results of models and improve the models by comparing the accuracy. </a:t>
+              <a:t>5. Evaluate the </a:t>
+            </a:r>
+            <a:r>
+              <a:rPr lang="en-GB" dirty="0" smtClean="0"/>
+              <a:t>predictions of the models by </a:t>
+            </a:r>
+            <a:r>
+              <a:rPr lang="en-GB" dirty="0"/>
+              <a:t>comparing </a:t>
+            </a:r>
+            <a:r>
+              <a:rPr lang="en-GB" dirty="0" smtClean="0"/>
+              <a:t>their </a:t>
+            </a:r>
+            <a:r>
+              <a:rPr lang="en-GB" dirty="0"/>
+              <a:t>accuracy. </a:t>
             </a:r>
           </a:p>
           <a:p>
@@ -3880,7 +3964,15 @@
           <a:p>
             <a:r>
               <a:rPr lang="en-US" b="1" dirty="0"/>
-              <a:t>Project management Approach</a:t>
+              <a:t>Project </a:t>
+            </a:r>
+            <a:r>
+              <a:rPr lang="en-US" b="1" dirty="0" smtClean="0"/>
+              <a:t>Management </a:t>
+            </a:r>
+            <a:r>
+              <a:rPr lang="en-US" b="1" dirty="0"/>
+              <a:t>Approach</a:t>
             </a:r>
             <a:br>
               <a:rPr lang="en-US" b="1" dirty="0"/>
@@ -4016,7 +4108,7 @@
           <p:cNvPr id="6" name="Content Placeholder 5">
             <a:extLst>
               <a:ext uri="{FF2B5EF4-FFF2-40B4-BE49-F238E27FC236}">
-                <a16:creationId xmlns:a16="http://schemas.microsoft.com/office/drawing/2014/main" id="{A5972240-A800-4639-962C-8765B592FA25}"/>
+                <a16:creationId xmlns:a16="http://schemas.microsoft.com/office/drawing/2014/main" xmlns="" id="{A5972240-A800-4639-962C-8765B592FA25}"/>
               </a:ext>
             </a:extLst>
           </p:cNvPr>
@@ -4241,7 +4333,7 @@
           <p:cNvPr id="5" name="Content Placeholder 4">
             <a:extLst>
               <a:ext uri="{FF2B5EF4-FFF2-40B4-BE49-F238E27FC236}">
-                <a16:creationId xmlns:a16="http://schemas.microsoft.com/office/drawing/2014/main" id="{060791E4-4338-4976-8F85-A8A14B1ADA60}"/>
+                <a16:creationId xmlns:a16="http://schemas.microsoft.com/office/drawing/2014/main" xmlns="" id="{060791E4-4338-4976-8F85-A8A14B1ADA60}"/>
               </a:ext>
             </a:extLst>
           </p:cNvPr>
@@ -4266,7 +4358,7 @@
           <p:cNvPr id="6" name="Picture 5">
             <a:extLst>
               <a:ext uri="{FF2B5EF4-FFF2-40B4-BE49-F238E27FC236}">
-                <a16:creationId xmlns:a16="http://schemas.microsoft.com/office/drawing/2014/main" id="{A763E8DD-E6AA-4634-B217-88B0E4956D42}"/>
+                <a16:creationId xmlns:a16="http://schemas.microsoft.com/office/drawing/2014/main" xmlns="" id="{A763E8DD-E6AA-4634-B217-88B0E4956D42}"/>
               </a:ext>
             </a:extLst>
           </p:cNvPr>
@@ -4420,7 +4512,7 @@
           <p:cNvPr id="5" name="Table 4">
             <a:extLst>
               <a:ext uri="{FF2B5EF4-FFF2-40B4-BE49-F238E27FC236}">
-                <a16:creationId xmlns:a16="http://schemas.microsoft.com/office/drawing/2014/main" id="{12AA1BE3-444A-460D-9543-7A2FF925C381}"/>
+                <a16:creationId xmlns:a16="http://schemas.microsoft.com/office/drawing/2014/main" xmlns="" id="{12AA1BE3-444A-460D-9543-7A2FF925C381}"/>
               </a:ext>
             </a:extLst>
           </p:cNvPr>
@@ -4449,42 +4541,42 @@
                 <a:gridCol w="1387102">
                   <a:extLst>
                     <a:ext uri="{9D8B030D-6E8A-4147-A177-3AD203B41FA5}">
-                      <a16:colId xmlns:a16="http://schemas.microsoft.com/office/drawing/2014/main" val="3419330438"/>
+                      <a16:colId xmlns:a16="http://schemas.microsoft.com/office/drawing/2014/main" xmlns="" val="3419330438"/>
                     </a:ext>
                   </a:extLst>
                 </a:gridCol>
                 <a:gridCol w="2826711">
                   <a:extLst>
                     <a:ext uri="{9D8B030D-6E8A-4147-A177-3AD203B41FA5}">
-                      <a16:colId xmlns:a16="http://schemas.microsoft.com/office/drawing/2014/main" val="1597577171"/>
+                      <a16:colId xmlns:a16="http://schemas.microsoft.com/office/drawing/2014/main" xmlns="" val="1597577171"/>
                     </a:ext>
                   </a:extLst>
                 </a:gridCol>
                 <a:gridCol w="1309507">
                   <a:extLst>
                     <a:ext uri="{9D8B030D-6E8A-4147-A177-3AD203B41FA5}">
-                      <a16:colId xmlns:a16="http://schemas.microsoft.com/office/drawing/2014/main" val="1271094361"/>
+                      <a16:colId xmlns:a16="http://schemas.microsoft.com/office/drawing/2014/main" xmlns="" val="1271094361"/>
                     </a:ext>
                   </a:extLst>
                 </a:gridCol>
                 <a:gridCol w="1296164">
                   <a:extLst>
                     <a:ext uri="{9D8B030D-6E8A-4147-A177-3AD203B41FA5}">
-                      <a16:colId xmlns:a16="http://schemas.microsoft.com/office/drawing/2014/main" val="2576608979"/>
+                      <a16:colId xmlns:a16="http://schemas.microsoft.com/office/drawing/2014/main" xmlns="" val="2576608979"/>
                     </a:ext>
                   </a:extLst>
                 </a:gridCol>
                 <a:gridCol w="1670750">
                   <a:extLst>
                     <a:ext uri="{9D8B030D-6E8A-4147-A177-3AD203B41FA5}">
-                      <a16:colId xmlns:a16="http://schemas.microsoft.com/office/drawing/2014/main" val="1489599960"/>
+                      <a16:colId xmlns:a16="http://schemas.microsoft.com/office/drawing/2014/main" xmlns="" val="1489599960"/>
                     </a:ext>
                   </a:extLst>
                 </a:gridCol>
                 <a:gridCol w="1371903">
                   <a:extLst>
                     <a:ext uri="{9D8B030D-6E8A-4147-A177-3AD203B41FA5}">
-                      <a16:colId xmlns:a16="http://schemas.microsoft.com/office/drawing/2014/main" val="3975143885"/>
+                      <a16:colId xmlns:a16="http://schemas.microsoft.com/office/drawing/2014/main" xmlns="" val="3975143885"/>
                     </a:ext>
                   </a:extLst>
                 </a:gridCol>
@@ -4666,7 +4758,7 @@
                 </a:tc>
                 <a:extLst>
                   <a:ext uri="{0D108BD9-81ED-4DB2-BD59-A6C34878D82A}">
-                    <a16:rowId xmlns:a16="http://schemas.microsoft.com/office/drawing/2014/main" val="3360850559"/>
+                    <a16:rowId xmlns:a16="http://schemas.microsoft.com/office/drawing/2014/main" xmlns="" val="3360850559"/>
                   </a:ext>
                 </a:extLst>
               </a:tr>
@@ -4847,7 +4939,7 @@
                 </a:tc>
                 <a:extLst>
                   <a:ext uri="{0D108BD9-81ED-4DB2-BD59-A6C34878D82A}">
-                    <a16:rowId xmlns:a16="http://schemas.microsoft.com/office/drawing/2014/main" val="3710823223"/>
+                    <a16:rowId xmlns:a16="http://schemas.microsoft.com/office/drawing/2014/main" xmlns="" val="3710823223"/>
                   </a:ext>
                 </a:extLst>
               </a:tr>
@@ -5028,7 +5120,7 @@
                 </a:tc>
                 <a:extLst>
                   <a:ext uri="{0D108BD9-81ED-4DB2-BD59-A6C34878D82A}">
-                    <a16:rowId xmlns:a16="http://schemas.microsoft.com/office/drawing/2014/main" val="3766666260"/>
+                    <a16:rowId xmlns:a16="http://schemas.microsoft.com/office/drawing/2014/main" xmlns="" val="3766666260"/>
                   </a:ext>
                 </a:extLst>
               </a:tr>
@@ -5209,7 +5301,7 @@
                 </a:tc>
                 <a:extLst>
                   <a:ext uri="{0D108BD9-81ED-4DB2-BD59-A6C34878D82A}">
-                    <a16:rowId xmlns:a16="http://schemas.microsoft.com/office/drawing/2014/main" val="3902622114"/>
+                    <a16:rowId xmlns:a16="http://schemas.microsoft.com/office/drawing/2014/main" xmlns="" val="3902622114"/>
                   </a:ext>
                 </a:extLst>
               </a:tr>
@@ -5507,7 +5599,7 @@
                 </a:tc>
                 <a:extLst>
                   <a:ext uri="{0D108BD9-81ED-4DB2-BD59-A6C34878D82A}">
-                    <a16:rowId xmlns:a16="http://schemas.microsoft.com/office/drawing/2014/main" val="2920387522"/>
+                    <a16:rowId xmlns:a16="http://schemas.microsoft.com/office/drawing/2014/main" xmlns="" val="2920387522"/>
                   </a:ext>
                 </a:extLst>
               </a:tr>
@@ -5688,7 +5780,7 @@
                 </a:tc>
                 <a:extLst>
                   <a:ext uri="{0D108BD9-81ED-4DB2-BD59-A6C34878D82A}">
-                    <a16:rowId xmlns:a16="http://schemas.microsoft.com/office/drawing/2014/main" val="1291085650"/>
+                    <a16:rowId xmlns:a16="http://schemas.microsoft.com/office/drawing/2014/main" xmlns="" val="1291085650"/>
                   </a:ext>
                 </a:extLst>
               </a:tr>
@@ -6136,7 +6228,7 @@
           <p:cNvPr id="3" name="Content Placeholder 2">
             <a:extLst>
               <a:ext uri="{FF2B5EF4-FFF2-40B4-BE49-F238E27FC236}">
-                <a16:creationId xmlns:a16="http://schemas.microsoft.com/office/drawing/2014/main" id="{F557CE22-70BF-43E4-9443-7EBA5BE77EE0}"/>
+                <a16:creationId xmlns:a16="http://schemas.microsoft.com/office/drawing/2014/main" xmlns="" id="{F557CE22-70BF-43E4-9443-7EBA5BE77EE0}"/>
               </a:ext>
             </a:extLst>
           </p:cNvPr>
@@ -6285,7 +6377,7 @@
           <p:cNvPr id="2" name="Title 1">
             <a:extLst>
               <a:ext uri="{FF2B5EF4-FFF2-40B4-BE49-F238E27FC236}">
-                <a16:creationId xmlns:a16="http://schemas.microsoft.com/office/drawing/2014/main" id="{50B5B8B7-7057-41AB-9E25-120640CC932B}"/>
+                <a16:creationId xmlns:a16="http://schemas.microsoft.com/office/drawing/2014/main" xmlns="" id="{50B5B8B7-7057-41AB-9E25-120640CC932B}"/>
               </a:ext>
             </a:extLst>
           </p:cNvPr>
@@ -6318,7 +6410,7 @@
           <p:cNvPr id="4" name="Content Placeholder 3">
             <a:extLst>
               <a:ext uri="{FF2B5EF4-FFF2-40B4-BE49-F238E27FC236}">
-                <a16:creationId xmlns:a16="http://schemas.microsoft.com/office/drawing/2014/main" id="{CB6D102C-BBBB-4478-94AD-C8FCA1B5282B}"/>
+                <a16:creationId xmlns:a16="http://schemas.microsoft.com/office/drawing/2014/main" xmlns="" id="{CB6D102C-BBBB-4478-94AD-C8FCA1B5282B}"/>
               </a:ext>
             </a:extLst>
           </p:cNvPr>
@@ -6380,7 +6472,7 @@
           <p:cNvPr id="2" name="Title 1">
             <a:extLst>
               <a:ext uri="{FF2B5EF4-FFF2-40B4-BE49-F238E27FC236}">
-                <a16:creationId xmlns:a16="http://schemas.microsoft.com/office/drawing/2014/main" id="{50B5B8B7-7057-41AB-9E25-120640CC932B}"/>
+                <a16:creationId xmlns:a16="http://schemas.microsoft.com/office/drawing/2014/main" xmlns="" id="{50B5B8B7-7057-41AB-9E25-120640CC932B}"/>
               </a:ext>
             </a:extLst>
           </p:cNvPr>
@@ -6413,7 +6505,7 @@
           <p:cNvPr id="4" name="Content Placeholder 3">
             <a:extLst>
               <a:ext uri="{FF2B5EF4-FFF2-40B4-BE49-F238E27FC236}">
-                <a16:creationId xmlns:a16="http://schemas.microsoft.com/office/drawing/2014/main" id="{CB6D102C-BBBB-4478-94AD-C8FCA1B5282B}"/>
+                <a16:creationId xmlns:a16="http://schemas.microsoft.com/office/drawing/2014/main" xmlns="" id="{CB6D102C-BBBB-4478-94AD-C8FCA1B5282B}"/>
               </a:ext>
             </a:extLst>
           </p:cNvPr>
@@ -6445,7 +6537,7 @@
           <p:cNvPr id="3" name="Rectangle 2">
             <a:extLst>
               <a:ext uri="{FF2B5EF4-FFF2-40B4-BE49-F238E27FC236}">
-                <a16:creationId xmlns:a16="http://schemas.microsoft.com/office/drawing/2014/main" id="{ADDBAF80-4449-4849-BBA1-06AC62849F4F}"/>
+                <a16:creationId xmlns:a16="http://schemas.microsoft.com/office/drawing/2014/main" xmlns="" id="{ADDBAF80-4449-4849-BBA1-06AC62849F4F}"/>
               </a:ext>
             </a:extLst>
           </p:cNvPr>
@@ -6497,7 +6589,7 @@
           <p:cNvPr id="5" name="Rectangle 4">
             <a:extLst>
               <a:ext uri="{FF2B5EF4-FFF2-40B4-BE49-F238E27FC236}">
-                <a16:creationId xmlns:a16="http://schemas.microsoft.com/office/drawing/2014/main" id="{07C4305F-53F9-47E1-A386-2184931D5C02}"/>
+                <a16:creationId xmlns:a16="http://schemas.microsoft.com/office/drawing/2014/main" xmlns="" id="{07C4305F-53F9-47E1-A386-2184931D5C02}"/>
               </a:ext>
             </a:extLst>
           </p:cNvPr>
@@ -6549,7 +6641,7 @@
           <p:cNvPr id="6" name="Title 1">
             <a:extLst>
               <a:ext uri="{FF2B5EF4-FFF2-40B4-BE49-F238E27FC236}">
-                <a16:creationId xmlns:a16="http://schemas.microsoft.com/office/drawing/2014/main" id="{F765D20E-1B20-44D2-9192-26CEC622E0FA}"/>
+                <a16:creationId xmlns:a16="http://schemas.microsoft.com/office/drawing/2014/main" xmlns="" id="{F765D20E-1B20-44D2-9192-26CEC622E0FA}"/>
               </a:ext>
             </a:extLst>
           </p:cNvPr>
@@ -6631,7 +6723,7 @@
           <p:cNvPr id="7" name="Rectangle 6">
             <a:extLst>
               <a:ext uri="{FF2B5EF4-FFF2-40B4-BE49-F238E27FC236}">
-                <a16:creationId xmlns:a16="http://schemas.microsoft.com/office/drawing/2014/main" id="{D463EF64-9FA2-40CF-A012-97C79A4C3921}"/>
+                <a16:creationId xmlns:a16="http://schemas.microsoft.com/office/drawing/2014/main" xmlns="" id="{D463EF64-9FA2-40CF-A012-97C79A4C3921}"/>
               </a:ext>
             </a:extLst>
           </p:cNvPr>
@@ -6803,14 +6895,14 @@
                 <a:gridCol w="3693626">
                   <a:extLst>
                     <a:ext uri="{9D8B030D-6E8A-4147-A177-3AD203B41FA5}">
-                      <a16:colId xmlns:a16="http://schemas.microsoft.com/office/drawing/2014/main" val="1698767686"/>
+                      <a16:colId xmlns:a16="http://schemas.microsoft.com/office/drawing/2014/main" xmlns="" val="1698767686"/>
                     </a:ext>
                   </a:extLst>
                 </a:gridCol>
                 <a:gridCol w="6854968">
                   <a:extLst>
                     <a:ext uri="{9D8B030D-6E8A-4147-A177-3AD203B41FA5}">
-                      <a16:colId xmlns:a16="http://schemas.microsoft.com/office/drawing/2014/main" val="3739461072"/>
+                      <a16:colId xmlns:a16="http://schemas.microsoft.com/office/drawing/2014/main" xmlns="" val="3739461072"/>
                     </a:ext>
                   </a:extLst>
                 </a:gridCol>
@@ -6846,7 +6938,7 @@
                 </a:tc>
                 <a:extLst>
                   <a:ext uri="{0D108BD9-81ED-4DB2-BD59-A6C34878D82A}">
-                    <a16:rowId xmlns:a16="http://schemas.microsoft.com/office/drawing/2014/main" val="1585607559"/>
+                    <a16:rowId xmlns:a16="http://schemas.microsoft.com/office/drawing/2014/main" xmlns="" val="1585607559"/>
                   </a:ext>
                 </a:extLst>
               </a:tr>
@@ -6888,7 +6980,7 @@
                 </a:tc>
                 <a:extLst>
                   <a:ext uri="{0D108BD9-81ED-4DB2-BD59-A6C34878D82A}">
-                    <a16:rowId xmlns:a16="http://schemas.microsoft.com/office/drawing/2014/main" val="655889649"/>
+                    <a16:rowId xmlns:a16="http://schemas.microsoft.com/office/drawing/2014/main" xmlns="" val="655889649"/>
                   </a:ext>
                 </a:extLst>
               </a:tr>
@@ -6944,7 +7036,7 @@
                 </a:tc>
                 <a:extLst>
                   <a:ext uri="{0D108BD9-81ED-4DB2-BD59-A6C34878D82A}">
-                    <a16:rowId xmlns:a16="http://schemas.microsoft.com/office/drawing/2014/main" val="308279976"/>
+                    <a16:rowId xmlns:a16="http://schemas.microsoft.com/office/drawing/2014/main" xmlns="" val="308279976"/>
                   </a:ext>
                 </a:extLst>
               </a:tr>
@@ -6997,7 +7089,7 @@
                 </a:tc>
                 <a:extLst>
                   <a:ext uri="{0D108BD9-81ED-4DB2-BD59-A6C34878D82A}">
-                    <a16:rowId xmlns:a16="http://schemas.microsoft.com/office/drawing/2014/main" val="855150034"/>
+                    <a16:rowId xmlns:a16="http://schemas.microsoft.com/office/drawing/2014/main" xmlns="" val="855150034"/>
                   </a:ext>
                 </a:extLst>
               </a:tr>
@@ -7040,7 +7132,7 @@
           <p:cNvPr id="2" name="Title 1">
             <a:extLst>
               <a:ext uri="{FF2B5EF4-FFF2-40B4-BE49-F238E27FC236}">
-                <a16:creationId xmlns:a16="http://schemas.microsoft.com/office/drawing/2014/main" id="{881F4BFC-93A9-4998-ABA3-F2477064AEE6}"/>
+                <a16:creationId xmlns:a16="http://schemas.microsoft.com/office/drawing/2014/main" xmlns="" id="{881F4BFC-93A9-4998-ABA3-F2477064AEE6}"/>
               </a:ext>
             </a:extLst>
           </p:cNvPr>
@@ -7075,7 +7167,7 @@
           <p:cNvPr id="4" name="Content Placeholder 3">
             <a:extLst>
               <a:ext uri="{FF2B5EF4-FFF2-40B4-BE49-F238E27FC236}">
-                <a16:creationId xmlns:a16="http://schemas.microsoft.com/office/drawing/2014/main" id="{B2A8F714-557D-4348-9CD0-8AB1C8407F45}"/>
+                <a16:creationId xmlns:a16="http://schemas.microsoft.com/office/drawing/2014/main" xmlns="" id="{B2A8F714-557D-4348-9CD0-8AB1C8407F45}"/>
               </a:ext>
             </a:extLst>
           </p:cNvPr>
@@ -7107,7 +7199,7 @@
           <p:cNvPr id="5" name="Title 1">
             <a:extLst>
               <a:ext uri="{FF2B5EF4-FFF2-40B4-BE49-F238E27FC236}">
-                <a16:creationId xmlns:a16="http://schemas.microsoft.com/office/drawing/2014/main" id="{ADBAD747-B5C6-46BB-B3B8-8B8AF3AB97FB}"/>
+                <a16:creationId xmlns:a16="http://schemas.microsoft.com/office/drawing/2014/main" xmlns="" id="{ADBAD747-B5C6-46BB-B3B8-8B8AF3AB97FB}"/>
               </a:ext>
             </a:extLst>
           </p:cNvPr>
@@ -7161,7 +7253,7 @@
           <p:cNvPr id="6" name="Picture 5">
             <a:extLst>
               <a:ext uri="{FF2B5EF4-FFF2-40B4-BE49-F238E27FC236}">
-                <a16:creationId xmlns:a16="http://schemas.microsoft.com/office/drawing/2014/main" id="{6B512ED6-BAD2-4382-AFED-9E47AFCF4F28}"/>
+                <a16:creationId xmlns:a16="http://schemas.microsoft.com/office/drawing/2014/main" xmlns="" id="{6B512ED6-BAD2-4382-AFED-9E47AFCF4F28}"/>
               </a:ext>
             </a:extLst>
           </p:cNvPr>
@@ -7191,7 +7283,7 @@
           <p:cNvPr id="7" name="Picture 6">
             <a:extLst>
               <a:ext uri="{FF2B5EF4-FFF2-40B4-BE49-F238E27FC236}">
-                <a16:creationId xmlns:a16="http://schemas.microsoft.com/office/drawing/2014/main" id="{0FC6D615-10B9-47C3-ACBB-876C9D5F7834}"/>
+                <a16:creationId xmlns:a16="http://schemas.microsoft.com/office/drawing/2014/main" xmlns="" id="{0FC6D615-10B9-47C3-ACBB-876C9D5F7834}"/>
               </a:ext>
             </a:extLst>
           </p:cNvPr>
@@ -7221,7 +7313,7 @@
           <p:cNvPr id="8" name="Content Placeholder 3">
             <a:extLst>
               <a:ext uri="{FF2B5EF4-FFF2-40B4-BE49-F238E27FC236}">
-                <a16:creationId xmlns:a16="http://schemas.microsoft.com/office/drawing/2014/main" id="{3B13F995-875D-4D2D-A5C5-DD92CA01265D}"/>
+                <a16:creationId xmlns:a16="http://schemas.microsoft.com/office/drawing/2014/main" xmlns="" id="{3B13F995-875D-4D2D-A5C5-DD92CA01265D}"/>
               </a:ext>
             </a:extLst>
           </p:cNvPr>
@@ -7251,7 +7343,7 @@
           <p:cNvPr id="9" name="Picture 8">
             <a:extLst>
               <a:ext uri="{FF2B5EF4-FFF2-40B4-BE49-F238E27FC236}">
-                <a16:creationId xmlns:a16="http://schemas.microsoft.com/office/drawing/2014/main" id="{02189670-977E-41F1-93B1-F5D823AA5D61}"/>
+                <a16:creationId xmlns:a16="http://schemas.microsoft.com/office/drawing/2014/main" xmlns="" id="{02189670-977E-41F1-93B1-F5D823AA5D61}"/>
               </a:ext>
             </a:extLst>
           </p:cNvPr>
@@ -7281,7 +7373,7 @@
           <p:cNvPr id="11" name="Picture 10">
             <a:extLst>
               <a:ext uri="{FF2B5EF4-FFF2-40B4-BE49-F238E27FC236}">
-                <a16:creationId xmlns:a16="http://schemas.microsoft.com/office/drawing/2014/main" id="{1B301697-0061-4023-A588-790715D20A36}"/>
+                <a16:creationId xmlns:a16="http://schemas.microsoft.com/office/drawing/2014/main" xmlns="" id="{1B301697-0061-4023-A588-790715D20A36}"/>
               </a:ext>
             </a:extLst>
           </p:cNvPr>
@@ -7341,7 +7433,7 @@
           <p:cNvPr id="2" name="Title 1">
             <a:extLst>
               <a:ext uri="{FF2B5EF4-FFF2-40B4-BE49-F238E27FC236}">
-                <a16:creationId xmlns:a16="http://schemas.microsoft.com/office/drawing/2014/main" id="{881F4BFC-93A9-4998-ABA3-F2477064AEE6}"/>
+                <a16:creationId xmlns:a16="http://schemas.microsoft.com/office/drawing/2014/main" xmlns="" id="{881F4BFC-93A9-4998-ABA3-F2477064AEE6}"/>
               </a:ext>
             </a:extLst>
           </p:cNvPr>
@@ -7376,7 +7468,7 @@
           <p:cNvPr id="4" name="Content Placeholder 3">
             <a:extLst>
               <a:ext uri="{FF2B5EF4-FFF2-40B4-BE49-F238E27FC236}">
-                <a16:creationId xmlns:a16="http://schemas.microsoft.com/office/drawing/2014/main" id="{B2A8F714-557D-4348-9CD0-8AB1C8407F45}"/>
+                <a16:creationId xmlns:a16="http://schemas.microsoft.com/office/drawing/2014/main" xmlns="" id="{B2A8F714-557D-4348-9CD0-8AB1C8407F45}"/>
               </a:ext>
             </a:extLst>
           </p:cNvPr>
@@ -7408,7 +7500,7 @@
           <p:cNvPr id="5" name="Title 1">
             <a:extLst>
               <a:ext uri="{FF2B5EF4-FFF2-40B4-BE49-F238E27FC236}">
-                <a16:creationId xmlns:a16="http://schemas.microsoft.com/office/drawing/2014/main" id="{ADBAD747-B5C6-46BB-B3B8-8B8AF3AB97FB}"/>
+                <a16:creationId xmlns:a16="http://schemas.microsoft.com/office/drawing/2014/main" xmlns="" id="{ADBAD747-B5C6-46BB-B3B8-8B8AF3AB97FB}"/>
               </a:ext>
             </a:extLst>
           </p:cNvPr>
@@ -7462,7 +7554,7 @@
           <p:cNvPr id="6" name="Picture 5">
             <a:extLst>
               <a:ext uri="{FF2B5EF4-FFF2-40B4-BE49-F238E27FC236}">
-                <a16:creationId xmlns:a16="http://schemas.microsoft.com/office/drawing/2014/main" id="{6B512ED6-BAD2-4382-AFED-9E47AFCF4F28}"/>
+                <a16:creationId xmlns:a16="http://schemas.microsoft.com/office/drawing/2014/main" xmlns="" id="{6B512ED6-BAD2-4382-AFED-9E47AFCF4F28}"/>
               </a:ext>
             </a:extLst>
           </p:cNvPr>
@@ -7492,7 +7584,7 @@
           <p:cNvPr id="7" name="Picture 6">
             <a:extLst>
               <a:ext uri="{FF2B5EF4-FFF2-40B4-BE49-F238E27FC236}">
-                <a16:creationId xmlns:a16="http://schemas.microsoft.com/office/drawing/2014/main" id="{0FC6D615-10B9-47C3-ACBB-876C9D5F7834}"/>
+                <a16:creationId xmlns:a16="http://schemas.microsoft.com/office/drawing/2014/main" xmlns="" id="{0FC6D615-10B9-47C3-ACBB-876C9D5F7834}"/>
               </a:ext>
             </a:extLst>
           </p:cNvPr>
@@ -7522,7 +7614,7 @@
           <p:cNvPr id="10" name="Title 1">
             <a:extLst>
               <a:ext uri="{FF2B5EF4-FFF2-40B4-BE49-F238E27FC236}">
-                <a16:creationId xmlns:a16="http://schemas.microsoft.com/office/drawing/2014/main" id="{55A94D4B-42B8-4D53-AC51-763CBA420BA5}"/>
+                <a16:creationId xmlns:a16="http://schemas.microsoft.com/office/drawing/2014/main" xmlns="" id="{55A94D4B-42B8-4D53-AC51-763CBA420BA5}"/>
               </a:ext>
             </a:extLst>
           </p:cNvPr>
@@ -7573,7 +7665,7 @@
           <p:cNvPr id="3" name="Picture 2">
             <a:extLst>
               <a:ext uri="{FF2B5EF4-FFF2-40B4-BE49-F238E27FC236}">
-                <a16:creationId xmlns:a16="http://schemas.microsoft.com/office/drawing/2014/main" id="{C929FE3B-73AD-43F4-B8CD-1654A81DDF47}"/>
+                <a16:creationId xmlns:a16="http://schemas.microsoft.com/office/drawing/2014/main" xmlns="" id="{C929FE3B-73AD-43F4-B8CD-1654A81DDF47}"/>
               </a:ext>
             </a:extLst>
           </p:cNvPr>
@@ -7603,7 +7695,7 @@
           <p:cNvPr id="12" name="Picture 11">
             <a:extLst>
               <a:ext uri="{FF2B5EF4-FFF2-40B4-BE49-F238E27FC236}">
-                <a16:creationId xmlns:a16="http://schemas.microsoft.com/office/drawing/2014/main" id="{42AD9D06-EB30-4313-9F6F-42617BAB28EF}"/>
+                <a16:creationId xmlns:a16="http://schemas.microsoft.com/office/drawing/2014/main" xmlns="" id="{42AD9D06-EB30-4313-9F6F-42617BAB28EF}"/>
               </a:ext>
             </a:extLst>
           </p:cNvPr>
@@ -7633,7 +7725,7 @@
           <p:cNvPr id="13" name="Picture 12">
             <a:extLst>
               <a:ext uri="{FF2B5EF4-FFF2-40B4-BE49-F238E27FC236}">
-                <a16:creationId xmlns:a16="http://schemas.microsoft.com/office/drawing/2014/main" id="{C2C8D329-6F9D-4348-B1A7-009652F26B92}"/>
+                <a16:creationId xmlns:a16="http://schemas.microsoft.com/office/drawing/2014/main" xmlns="" id="{C2C8D329-6F9D-4348-B1A7-009652F26B92}"/>
               </a:ext>
             </a:extLst>
           </p:cNvPr>
@@ -7663,7 +7755,7 @@
           <p:cNvPr id="16" name="Content Placeholder 2">
             <a:extLst>
               <a:ext uri="{FF2B5EF4-FFF2-40B4-BE49-F238E27FC236}">
-                <a16:creationId xmlns:a16="http://schemas.microsoft.com/office/drawing/2014/main" id="{51614195-F03E-476E-A4B9-4499F77402ED}"/>
+                <a16:creationId xmlns:a16="http://schemas.microsoft.com/office/drawing/2014/main" xmlns="" id="{51614195-F03E-476E-A4B9-4499F77402ED}"/>
               </a:ext>
             </a:extLst>
           </p:cNvPr>
@@ -7870,7 +7962,7 @@
           <p:cNvPr id="17" name="Content Placeholder 2">
             <a:extLst>
               <a:ext uri="{FF2B5EF4-FFF2-40B4-BE49-F238E27FC236}">
-                <a16:creationId xmlns:a16="http://schemas.microsoft.com/office/drawing/2014/main" id="{ED1634C0-8470-4BAC-AAA9-C1FE07ACD9D1}"/>
+                <a16:creationId xmlns:a16="http://schemas.microsoft.com/office/drawing/2014/main" xmlns="" id="{ED1634C0-8470-4BAC-AAA9-C1FE07ACD9D1}"/>
               </a:ext>
             </a:extLst>
           </p:cNvPr>
@@ -8121,7 +8213,7 @@
           <p:cNvPr id="2" name="Title 1">
             <a:extLst>
               <a:ext uri="{FF2B5EF4-FFF2-40B4-BE49-F238E27FC236}">
-                <a16:creationId xmlns:a16="http://schemas.microsoft.com/office/drawing/2014/main" id="{881F4BFC-93A9-4998-ABA3-F2477064AEE6}"/>
+                <a16:creationId xmlns:a16="http://schemas.microsoft.com/office/drawing/2014/main" xmlns="" id="{881F4BFC-93A9-4998-ABA3-F2477064AEE6}"/>
               </a:ext>
             </a:extLst>
           </p:cNvPr>
@@ -8156,7 +8248,7 @@
           <p:cNvPr id="4" name="Content Placeholder 3">
             <a:extLst>
               <a:ext uri="{FF2B5EF4-FFF2-40B4-BE49-F238E27FC236}">
-                <a16:creationId xmlns:a16="http://schemas.microsoft.com/office/drawing/2014/main" id="{B2A8F714-557D-4348-9CD0-8AB1C8407F45}"/>
+                <a16:creationId xmlns:a16="http://schemas.microsoft.com/office/drawing/2014/main" xmlns="" id="{B2A8F714-557D-4348-9CD0-8AB1C8407F45}"/>
               </a:ext>
             </a:extLst>
           </p:cNvPr>
@@ -8188,7 +8280,7 @@
           <p:cNvPr id="5" name="Title 1">
             <a:extLst>
               <a:ext uri="{FF2B5EF4-FFF2-40B4-BE49-F238E27FC236}">
-                <a16:creationId xmlns:a16="http://schemas.microsoft.com/office/drawing/2014/main" id="{ADBAD747-B5C6-46BB-B3B8-8B8AF3AB97FB}"/>
+                <a16:creationId xmlns:a16="http://schemas.microsoft.com/office/drawing/2014/main" xmlns="" id="{ADBAD747-B5C6-46BB-B3B8-8B8AF3AB97FB}"/>
               </a:ext>
             </a:extLst>
           </p:cNvPr>
@@ -8242,7 +8334,7 @@
           <p:cNvPr id="6" name="Picture 5">
             <a:extLst>
               <a:ext uri="{FF2B5EF4-FFF2-40B4-BE49-F238E27FC236}">
-                <a16:creationId xmlns:a16="http://schemas.microsoft.com/office/drawing/2014/main" id="{6B512ED6-BAD2-4382-AFED-9E47AFCF4F28}"/>
+                <a16:creationId xmlns:a16="http://schemas.microsoft.com/office/drawing/2014/main" xmlns="" id="{6B512ED6-BAD2-4382-AFED-9E47AFCF4F28}"/>
               </a:ext>
             </a:extLst>
           </p:cNvPr>
@@ -8272,7 +8364,7 @@
           <p:cNvPr id="7" name="Picture 6">
             <a:extLst>
               <a:ext uri="{FF2B5EF4-FFF2-40B4-BE49-F238E27FC236}">
-                <a16:creationId xmlns:a16="http://schemas.microsoft.com/office/drawing/2014/main" id="{0FC6D615-10B9-47C3-ACBB-876C9D5F7834}"/>
+                <a16:creationId xmlns:a16="http://schemas.microsoft.com/office/drawing/2014/main" xmlns="" id="{0FC6D615-10B9-47C3-ACBB-876C9D5F7834}"/>
               </a:ext>
             </a:extLst>
           </p:cNvPr>
@@ -8302,7 +8394,7 @@
           <p:cNvPr id="10" name="Title 1">
             <a:extLst>
               <a:ext uri="{FF2B5EF4-FFF2-40B4-BE49-F238E27FC236}">
-                <a16:creationId xmlns:a16="http://schemas.microsoft.com/office/drawing/2014/main" id="{55A94D4B-42B8-4D53-AC51-763CBA420BA5}"/>
+                <a16:creationId xmlns:a16="http://schemas.microsoft.com/office/drawing/2014/main" xmlns="" id="{55A94D4B-42B8-4D53-AC51-763CBA420BA5}"/>
               </a:ext>
             </a:extLst>
           </p:cNvPr>
@@ -8353,7 +8445,7 @@
           <p:cNvPr id="3" name="Picture 2">
             <a:extLst>
               <a:ext uri="{FF2B5EF4-FFF2-40B4-BE49-F238E27FC236}">
-                <a16:creationId xmlns:a16="http://schemas.microsoft.com/office/drawing/2014/main" id="{C929FE3B-73AD-43F4-B8CD-1654A81DDF47}"/>
+                <a16:creationId xmlns:a16="http://schemas.microsoft.com/office/drawing/2014/main" xmlns="" id="{C929FE3B-73AD-43F4-B8CD-1654A81DDF47}"/>
               </a:ext>
             </a:extLst>
           </p:cNvPr>
@@ -8383,7 +8475,7 @@
           <p:cNvPr id="12" name="Picture 11">
             <a:extLst>
               <a:ext uri="{FF2B5EF4-FFF2-40B4-BE49-F238E27FC236}">
-                <a16:creationId xmlns:a16="http://schemas.microsoft.com/office/drawing/2014/main" id="{42AD9D06-EB30-4313-9F6F-42617BAB28EF}"/>
+                <a16:creationId xmlns:a16="http://schemas.microsoft.com/office/drawing/2014/main" xmlns="" id="{42AD9D06-EB30-4313-9F6F-42617BAB28EF}"/>
               </a:ext>
             </a:extLst>
           </p:cNvPr>
@@ -8413,7 +8505,7 @@
           <p:cNvPr id="13" name="Picture 12">
             <a:extLst>
               <a:ext uri="{FF2B5EF4-FFF2-40B4-BE49-F238E27FC236}">
-                <a16:creationId xmlns:a16="http://schemas.microsoft.com/office/drawing/2014/main" id="{C2C8D329-6F9D-4348-B1A7-009652F26B92}"/>
+                <a16:creationId xmlns:a16="http://schemas.microsoft.com/office/drawing/2014/main" xmlns="" id="{C2C8D329-6F9D-4348-B1A7-009652F26B92}"/>
               </a:ext>
             </a:extLst>
           </p:cNvPr>
@@ -8443,7 +8535,7 @@
           <p:cNvPr id="16" name="Content Placeholder 2">
             <a:extLst>
               <a:ext uri="{FF2B5EF4-FFF2-40B4-BE49-F238E27FC236}">
-                <a16:creationId xmlns:a16="http://schemas.microsoft.com/office/drawing/2014/main" id="{51614195-F03E-476E-A4B9-4499F77402ED}"/>
+                <a16:creationId xmlns:a16="http://schemas.microsoft.com/office/drawing/2014/main" xmlns="" id="{51614195-F03E-476E-A4B9-4499F77402ED}"/>
               </a:ext>
             </a:extLst>
           </p:cNvPr>
@@ -8650,7 +8742,7 @@
           <p:cNvPr id="17" name="Content Placeholder 2">
             <a:extLst>
               <a:ext uri="{FF2B5EF4-FFF2-40B4-BE49-F238E27FC236}">
-                <a16:creationId xmlns:a16="http://schemas.microsoft.com/office/drawing/2014/main" id="{ED1634C0-8470-4BAC-AAA9-C1FE07ACD9D1}"/>
+                <a16:creationId xmlns:a16="http://schemas.microsoft.com/office/drawing/2014/main" xmlns="" id="{ED1634C0-8470-4BAC-AAA9-C1FE07ACD9D1}"/>
               </a:ext>
             </a:extLst>
           </p:cNvPr>
@@ -8871,7 +8963,7 @@
           <p:cNvPr id="18" name="Straight Connector 17">
             <a:extLst>
               <a:ext uri="{FF2B5EF4-FFF2-40B4-BE49-F238E27FC236}">
-                <a16:creationId xmlns:a16="http://schemas.microsoft.com/office/drawing/2014/main" id="{8D6B047D-62D2-4CAA-8745-150F5749442F}"/>
+                <a16:creationId xmlns:a16="http://schemas.microsoft.com/office/drawing/2014/main" xmlns="" id="{8D6B047D-62D2-4CAA-8745-150F5749442F}"/>
               </a:ext>
             </a:extLst>
           </p:cNvPr>
@@ -8912,7 +9004,7 @@
           <p:cNvPr id="19" name="Straight Connector 18">
             <a:extLst>
               <a:ext uri="{FF2B5EF4-FFF2-40B4-BE49-F238E27FC236}">
-                <a16:creationId xmlns:a16="http://schemas.microsoft.com/office/drawing/2014/main" id="{235E25EC-1775-4432-871D-C98242593FC5}"/>
+                <a16:creationId xmlns:a16="http://schemas.microsoft.com/office/drawing/2014/main" xmlns="" id="{235E25EC-1775-4432-871D-C98242593FC5}"/>
               </a:ext>
             </a:extLst>
           </p:cNvPr>
@@ -8953,7 +9045,7 @@
           <p:cNvPr id="20" name="Straight Connector 19">
             <a:extLst>
               <a:ext uri="{FF2B5EF4-FFF2-40B4-BE49-F238E27FC236}">
-                <a16:creationId xmlns:a16="http://schemas.microsoft.com/office/drawing/2014/main" id="{66934499-30D6-48A7-B1F7-E2236A6115D5}"/>
+                <a16:creationId xmlns:a16="http://schemas.microsoft.com/office/drawing/2014/main" xmlns="" id="{66934499-30D6-48A7-B1F7-E2236A6115D5}"/>
               </a:ext>
             </a:extLst>
           </p:cNvPr>
@@ -8994,7 +9086,7 @@
           <p:cNvPr id="21" name="Straight Connector 20">
             <a:extLst>
               <a:ext uri="{FF2B5EF4-FFF2-40B4-BE49-F238E27FC236}">
-                <a16:creationId xmlns:a16="http://schemas.microsoft.com/office/drawing/2014/main" id="{F43F6FFC-E9AF-4B60-9179-A908DD2E934C}"/>
+                <a16:creationId xmlns:a16="http://schemas.microsoft.com/office/drawing/2014/main" xmlns="" id="{F43F6FFC-E9AF-4B60-9179-A908DD2E934C}"/>
               </a:ext>
             </a:extLst>
           </p:cNvPr>
@@ -9035,7 +9127,7 @@
           <p:cNvPr id="22" name="Straight Connector 21">
             <a:extLst>
               <a:ext uri="{FF2B5EF4-FFF2-40B4-BE49-F238E27FC236}">
-                <a16:creationId xmlns:a16="http://schemas.microsoft.com/office/drawing/2014/main" id="{561A8249-1076-4FB9-A7C4-C3FB5ACCABF6}"/>
+                <a16:creationId xmlns:a16="http://schemas.microsoft.com/office/drawing/2014/main" xmlns="" id="{561A8249-1076-4FB9-A7C4-C3FB5ACCABF6}"/>
               </a:ext>
             </a:extLst>
           </p:cNvPr>
@@ -9076,7 +9168,7 @@
           <p:cNvPr id="23" name="Straight Connector 22">
             <a:extLst>
               <a:ext uri="{FF2B5EF4-FFF2-40B4-BE49-F238E27FC236}">
-                <a16:creationId xmlns:a16="http://schemas.microsoft.com/office/drawing/2014/main" id="{C301F0D3-DCBD-4DF8-9FB4-39A02A97EA59}"/>
+                <a16:creationId xmlns:a16="http://schemas.microsoft.com/office/drawing/2014/main" xmlns="" id="{C301F0D3-DCBD-4DF8-9FB4-39A02A97EA59}"/>
               </a:ext>
             </a:extLst>
           </p:cNvPr>
@@ -9147,7 +9239,7 @@
           <p:cNvPr id="2" name="Title 1">
             <a:extLst>
               <a:ext uri="{FF2B5EF4-FFF2-40B4-BE49-F238E27FC236}">
-                <a16:creationId xmlns:a16="http://schemas.microsoft.com/office/drawing/2014/main" id="{881F4BFC-93A9-4998-ABA3-F2477064AEE6}"/>
+                <a16:creationId xmlns:a16="http://schemas.microsoft.com/office/drawing/2014/main" xmlns="" id="{881F4BFC-93A9-4998-ABA3-F2477064AEE6}"/>
               </a:ext>
             </a:extLst>
           </p:cNvPr>
@@ -9182,7 +9274,7 @@
           <p:cNvPr id="4" name="Content Placeholder 3">
             <a:extLst>
               <a:ext uri="{FF2B5EF4-FFF2-40B4-BE49-F238E27FC236}">
-                <a16:creationId xmlns:a16="http://schemas.microsoft.com/office/drawing/2014/main" id="{B2A8F714-557D-4348-9CD0-8AB1C8407F45}"/>
+                <a16:creationId xmlns:a16="http://schemas.microsoft.com/office/drawing/2014/main" xmlns="" id="{B2A8F714-557D-4348-9CD0-8AB1C8407F45}"/>
               </a:ext>
             </a:extLst>
           </p:cNvPr>
@@ -9214,7 +9306,7 @@
           <p:cNvPr id="5" name="Title 1">
             <a:extLst>
               <a:ext uri="{FF2B5EF4-FFF2-40B4-BE49-F238E27FC236}">
-                <a16:creationId xmlns:a16="http://schemas.microsoft.com/office/drawing/2014/main" id="{ADBAD747-B5C6-46BB-B3B8-8B8AF3AB97FB}"/>
+                <a16:creationId xmlns:a16="http://schemas.microsoft.com/office/drawing/2014/main" xmlns="" id="{ADBAD747-B5C6-46BB-B3B8-8B8AF3AB97FB}"/>
               </a:ext>
             </a:extLst>
           </p:cNvPr>
@@ -9268,7 +9360,7 @@
           <p:cNvPr id="6" name="Picture 5">
             <a:extLst>
               <a:ext uri="{FF2B5EF4-FFF2-40B4-BE49-F238E27FC236}">
-                <a16:creationId xmlns:a16="http://schemas.microsoft.com/office/drawing/2014/main" id="{6B512ED6-BAD2-4382-AFED-9E47AFCF4F28}"/>
+                <a16:creationId xmlns:a16="http://schemas.microsoft.com/office/drawing/2014/main" xmlns="" id="{6B512ED6-BAD2-4382-AFED-9E47AFCF4F28}"/>
               </a:ext>
             </a:extLst>
           </p:cNvPr>
@@ -9298,7 +9390,7 @@
           <p:cNvPr id="7" name="Picture 6">
             <a:extLst>
               <a:ext uri="{FF2B5EF4-FFF2-40B4-BE49-F238E27FC236}">
-                <a16:creationId xmlns:a16="http://schemas.microsoft.com/office/drawing/2014/main" id="{0FC6D615-10B9-47C3-ACBB-876C9D5F7834}"/>
+                <a16:creationId xmlns:a16="http://schemas.microsoft.com/office/drawing/2014/main" xmlns="" id="{0FC6D615-10B9-47C3-ACBB-876C9D5F7834}"/>
               </a:ext>
             </a:extLst>
           </p:cNvPr>
@@ -9328,7 +9420,7 @@
           <p:cNvPr id="10" name="Title 1">
             <a:extLst>
               <a:ext uri="{FF2B5EF4-FFF2-40B4-BE49-F238E27FC236}">
-                <a16:creationId xmlns:a16="http://schemas.microsoft.com/office/drawing/2014/main" id="{55A94D4B-42B8-4D53-AC51-763CBA420BA5}"/>
+                <a16:creationId xmlns:a16="http://schemas.microsoft.com/office/drawing/2014/main" xmlns="" id="{55A94D4B-42B8-4D53-AC51-763CBA420BA5}"/>
               </a:ext>
             </a:extLst>
           </p:cNvPr>
@@ -9379,7 +9471,7 @@
           <p:cNvPr id="3" name="Picture 2">
             <a:extLst>
               <a:ext uri="{FF2B5EF4-FFF2-40B4-BE49-F238E27FC236}">
-                <a16:creationId xmlns:a16="http://schemas.microsoft.com/office/drawing/2014/main" id="{C929FE3B-73AD-43F4-B8CD-1654A81DDF47}"/>
+                <a16:creationId xmlns:a16="http://schemas.microsoft.com/office/drawing/2014/main" xmlns="" id="{C929FE3B-73AD-43F4-B8CD-1654A81DDF47}"/>
               </a:ext>
             </a:extLst>
           </p:cNvPr>
@@ -9409,7 +9501,7 @@
           <p:cNvPr id="12" name="Picture 11">
             <a:extLst>
               <a:ext uri="{FF2B5EF4-FFF2-40B4-BE49-F238E27FC236}">
-                <a16:creationId xmlns:a16="http://schemas.microsoft.com/office/drawing/2014/main" id="{42AD9D06-EB30-4313-9F6F-42617BAB28EF}"/>
+                <a16:creationId xmlns:a16="http://schemas.microsoft.com/office/drawing/2014/main" xmlns="" id="{42AD9D06-EB30-4313-9F6F-42617BAB28EF}"/>
               </a:ext>
             </a:extLst>
           </p:cNvPr>
@@ -9439,7 +9531,7 @@
           <p:cNvPr id="13" name="Picture 12">
             <a:extLst>
               <a:ext uri="{FF2B5EF4-FFF2-40B4-BE49-F238E27FC236}">
-                <a16:creationId xmlns:a16="http://schemas.microsoft.com/office/drawing/2014/main" id="{C2C8D329-6F9D-4348-B1A7-009652F26B92}"/>
+                <a16:creationId xmlns:a16="http://schemas.microsoft.com/office/drawing/2014/main" xmlns="" id="{C2C8D329-6F9D-4348-B1A7-009652F26B92}"/>
               </a:ext>
             </a:extLst>
           </p:cNvPr>
@@ -9469,7 +9561,7 @@
           <p:cNvPr id="16" name="Content Placeholder 2">
             <a:extLst>
               <a:ext uri="{FF2B5EF4-FFF2-40B4-BE49-F238E27FC236}">
-                <a16:creationId xmlns:a16="http://schemas.microsoft.com/office/drawing/2014/main" id="{51614195-F03E-476E-A4B9-4499F77402ED}"/>
+                <a16:creationId xmlns:a16="http://schemas.microsoft.com/office/drawing/2014/main" xmlns="" id="{51614195-F03E-476E-A4B9-4499F77402ED}"/>
               </a:ext>
             </a:extLst>
           </p:cNvPr>
@@ -9676,7 +9768,7 @@
           <p:cNvPr id="17" name="Content Placeholder 2">
             <a:extLst>
               <a:ext uri="{FF2B5EF4-FFF2-40B4-BE49-F238E27FC236}">
-                <a16:creationId xmlns:a16="http://schemas.microsoft.com/office/drawing/2014/main" id="{ED1634C0-8470-4BAC-AAA9-C1FE07ACD9D1}"/>
+                <a16:creationId xmlns:a16="http://schemas.microsoft.com/office/drawing/2014/main" xmlns="" id="{ED1634C0-8470-4BAC-AAA9-C1FE07ACD9D1}"/>
               </a:ext>
             </a:extLst>
           </p:cNvPr>
@@ -9897,7 +9989,7 @@
           <p:cNvPr id="18" name="Straight Connector 17">
             <a:extLst>
               <a:ext uri="{FF2B5EF4-FFF2-40B4-BE49-F238E27FC236}">
-                <a16:creationId xmlns:a16="http://schemas.microsoft.com/office/drawing/2014/main" id="{8D6B047D-62D2-4CAA-8745-150F5749442F}"/>
+                <a16:creationId xmlns:a16="http://schemas.microsoft.com/office/drawing/2014/main" xmlns="" id="{8D6B047D-62D2-4CAA-8745-150F5749442F}"/>
               </a:ext>
             </a:extLst>
           </p:cNvPr>
@@ -9938,7 +10030,7 @@
           <p:cNvPr id="19" name="Straight Connector 18">
             <a:extLst>
               <a:ext uri="{FF2B5EF4-FFF2-40B4-BE49-F238E27FC236}">
-                <a16:creationId xmlns:a16="http://schemas.microsoft.com/office/drawing/2014/main" id="{235E25EC-1775-4432-871D-C98242593FC5}"/>
+                <a16:creationId xmlns:a16="http://schemas.microsoft.com/office/drawing/2014/main" xmlns="" id="{235E25EC-1775-4432-871D-C98242593FC5}"/>
               </a:ext>
             </a:extLst>
           </p:cNvPr>
@@ -9979,7 +10071,7 @@
           <p:cNvPr id="20" name="Straight Connector 19">
             <a:extLst>
               <a:ext uri="{FF2B5EF4-FFF2-40B4-BE49-F238E27FC236}">
-                <a16:creationId xmlns:a16="http://schemas.microsoft.com/office/drawing/2014/main" id="{66934499-30D6-48A7-B1F7-E2236A6115D5}"/>
+                <a16:creationId xmlns:a16="http://schemas.microsoft.com/office/drawing/2014/main" xmlns="" id="{66934499-30D6-48A7-B1F7-E2236A6115D5}"/>
               </a:ext>
             </a:extLst>
           </p:cNvPr>
@@ -10020,7 +10112,7 @@
           <p:cNvPr id="21" name="Straight Connector 20">
             <a:extLst>
               <a:ext uri="{FF2B5EF4-FFF2-40B4-BE49-F238E27FC236}">
-                <a16:creationId xmlns:a16="http://schemas.microsoft.com/office/drawing/2014/main" id="{F43F6FFC-E9AF-4B60-9179-A908DD2E934C}"/>
+                <a16:creationId xmlns:a16="http://schemas.microsoft.com/office/drawing/2014/main" xmlns="" id="{F43F6FFC-E9AF-4B60-9179-A908DD2E934C}"/>
               </a:ext>
             </a:extLst>
           </p:cNvPr>
@@ -10061,7 +10153,7 @@
           <p:cNvPr id="22" name="Straight Connector 21">
             <a:extLst>
               <a:ext uri="{FF2B5EF4-FFF2-40B4-BE49-F238E27FC236}">
-                <a16:creationId xmlns:a16="http://schemas.microsoft.com/office/drawing/2014/main" id="{561A8249-1076-4FB9-A7C4-C3FB5ACCABF6}"/>
+                <a16:creationId xmlns:a16="http://schemas.microsoft.com/office/drawing/2014/main" xmlns="" id="{561A8249-1076-4FB9-A7C4-C3FB5ACCABF6}"/>
               </a:ext>
             </a:extLst>
           </p:cNvPr>
@@ -10102,7 +10194,7 @@
           <p:cNvPr id="23" name="Straight Connector 22">
             <a:extLst>
               <a:ext uri="{FF2B5EF4-FFF2-40B4-BE49-F238E27FC236}">
-                <a16:creationId xmlns:a16="http://schemas.microsoft.com/office/drawing/2014/main" id="{C301F0D3-DCBD-4DF8-9FB4-39A02A97EA59}"/>
+                <a16:creationId xmlns:a16="http://schemas.microsoft.com/office/drawing/2014/main" xmlns="" id="{C301F0D3-DCBD-4DF8-9FB4-39A02A97EA59}"/>
               </a:ext>
             </a:extLst>
           </p:cNvPr>
@@ -10143,7 +10235,7 @@
           <p:cNvPr id="24" name="Oval 23">
             <a:extLst>
               <a:ext uri="{FF2B5EF4-FFF2-40B4-BE49-F238E27FC236}">
-                <a16:creationId xmlns:a16="http://schemas.microsoft.com/office/drawing/2014/main" id="{D72AAC99-F01F-491C-92B7-26AD95DCAE99}"/>
+                <a16:creationId xmlns:a16="http://schemas.microsoft.com/office/drawing/2014/main" xmlns="" id="{D72AAC99-F01F-491C-92B7-26AD95DCAE99}"/>
               </a:ext>
             </a:extLst>
           </p:cNvPr>
@@ -10223,7 +10315,7 @@
           <p:cNvPr id="2" name="Title 1">
             <a:extLst>
               <a:ext uri="{FF2B5EF4-FFF2-40B4-BE49-F238E27FC236}">
-                <a16:creationId xmlns:a16="http://schemas.microsoft.com/office/drawing/2014/main" id="{881F4BFC-93A9-4998-ABA3-F2477064AEE6}"/>
+                <a16:creationId xmlns:a16="http://schemas.microsoft.com/office/drawing/2014/main" xmlns="" id="{881F4BFC-93A9-4998-ABA3-F2477064AEE6}"/>
               </a:ext>
             </a:extLst>
           </p:cNvPr>
@@ -10258,7 +10350,7 @@
           <p:cNvPr id="4" name="Content Placeholder 3">
             <a:extLst>
               <a:ext uri="{FF2B5EF4-FFF2-40B4-BE49-F238E27FC236}">
-                <a16:creationId xmlns:a16="http://schemas.microsoft.com/office/drawing/2014/main" id="{B2A8F714-557D-4348-9CD0-8AB1C8407F45}"/>
+                <a16:creationId xmlns:a16="http://schemas.microsoft.com/office/drawing/2014/main" xmlns="" id="{B2A8F714-557D-4348-9CD0-8AB1C8407F45}"/>
               </a:ext>
             </a:extLst>
           </p:cNvPr>
@@ -10290,7 +10382,7 @@
           <p:cNvPr id="5" name="Title 1">
             <a:extLst>
               <a:ext uri="{FF2B5EF4-FFF2-40B4-BE49-F238E27FC236}">
-                <a16:creationId xmlns:a16="http://schemas.microsoft.com/office/drawing/2014/main" id="{ADBAD747-B5C6-46BB-B3B8-8B8AF3AB97FB}"/>
+                <a16:creationId xmlns:a16="http://schemas.microsoft.com/office/drawing/2014/main" xmlns="" id="{ADBAD747-B5C6-46BB-B3B8-8B8AF3AB97FB}"/>
               </a:ext>
             </a:extLst>
           </p:cNvPr>
@@ -10344,7 +10436,7 @@
           <p:cNvPr id="6" name="Picture 5">
             <a:extLst>
               <a:ext uri="{FF2B5EF4-FFF2-40B4-BE49-F238E27FC236}">
-                <a16:creationId xmlns:a16="http://schemas.microsoft.com/office/drawing/2014/main" id="{6B512ED6-BAD2-4382-AFED-9E47AFCF4F28}"/>
+                <a16:creationId xmlns:a16="http://schemas.microsoft.com/office/drawing/2014/main" xmlns="" id="{6B512ED6-BAD2-4382-AFED-9E47AFCF4F28}"/>
               </a:ext>
             </a:extLst>
           </p:cNvPr>
@@ -10374,7 +10466,7 @@
           <p:cNvPr id="7" name="Picture 6">
             <a:extLst>
               <a:ext uri="{FF2B5EF4-FFF2-40B4-BE49-F238E27FC236}">
-                <a16:creationId xmlns:a16="http://schemas.microsoft.com/office/drawing/2014/main" id="{0FC6D615-10B9-47C3-ACBB-876C9D5F7834}"/>
+                <a16:creationId xmlns:a16="http://schemas.microsoft.com/office/drawing/2014/main" xmlns="" id="{0FC6D615-10B9-47C3-ACBB-876C9D5F7834}"/>
               </a:ext>
             </a:extLst>
           </p:cNvPr>
@@ -10404,7 +10496,7 @@
           <p:cNvPr id="10" name="Title 1">
             <a:extLst>
               <a:ext uri="{FF2B5EF4-FFF2-40B4-BE49-F238E27FC236}">
-                <a16:creationId xmlns:a16="http://schemas.microsoft.com/office/drawing/2014/main" id="{55A94D4B-42B8-4D53-AC51-763CBA420BA5}"/>
+                <a16:creationId xmlns:a16="http://schemas.microsoft.com/office/drawing/2014/main" xmlns="" id="{55A94D4B-42B8-4D53-AC51-763CBA420BA5}"/>
               </a:ext>
             </a:extLst>
           </p:cNvPr>
@@ -10455,7 +10547,7 @@
           <p:cNvPr id="3" name="Picture 2">
             <a:extLst>
               <a:ext uri="{FF2B5EF4-FFF2-40B4-BE49-F238E27FC236}">
-                <a16:creationId xmlns:a16="http://schemas.microsoft.com/office/drawing/2014/main" id="{C929FE3B-73AD-43F4-B8CD-1654A81DDF47}"/>
+                <a16:creationId xmlns:a16="http://schemas.microsoft.com/office/drawing/2014/main" xmlns="" id="{C929FE3B-73AD-43F4-B8CD-1654A81DDF47}"/>
               </a:ext>
             </a:extLst>
           </p:cNvPr>
@@ -10485,7 +10577,7 @@
           <p:cNvPr id="12" name="Picture 11">
             <a:extLst>
               <a:ext uri="{FF2B5EF4-FFF2-40B4-BE49-F238E27FC236}">
-                <a16:creationId xmlns:a16="http://schemas.microsoft.com/office/drawing/2014/main" id="{42AD9D06-EB30-4313-9F6F-42617BAB28EF}"/>
+                <a16:creationId xmlns:a16="http://schemas.microsoft.com/office/drawing/2014/main" xmlns="" id="{42AD9D06-EB30-4313-9F6F-42617BAB28EF}"/>
               </a:ext>
             </a:extLst>
           </p:cNvPr>
@@ -10515,7 +10607,7 @@
           <p:cNvPr id="13" name="Picture 12">
             <a:extLst>
               <a:ext uri="{FF2B5EF4-FFF2-40B4-BE49-F238E27FC236}">
-                <a16:creationId xmlns:a16="http://schemas.microsoft.com/office/drawing/2014/main" id="{C2C8D329-6F9D-4348-B1A7-009652F26B92}"/>
+                <a16:creationId xmlns:a16="http://schemas.microsoft.com/office/drawing/2014/main" xmlns="" id="{C2C8D329-6F9D-4348-B1A7-009652F26B92}"/>
               </a:ext>
             </a:extLst>
           </p:cNvPr>
@@ -10545,7 +10637,7 @@
           <p:cNvPr id="16" name="Content Placeholder 2">
             <a:extLst>
               <a:ext uri="{FF2B5EF4-FFF2-40B4-BE49-F238E27FC236}">
-                <a16:creationId xmlns:a16="http://schemas.microsoft.com/office/drawing/2014/main" id="{51614195-F03E-476E-A4B9-4499F77402ED}"/>
+                <a16:creationId xmlns:a16="http://schemas.microsoft.com/office/drawing/2014/main" xmlns="" id="{51614195-F03E-476E-A4B9-4499F77402ED}"/>
               </a:ext>
             </a:extLst>
           </p:cNvPr>
@@ -10752,7 +10844,7 @@
           <p:cNvPr id="17" name="Content Placeholder 2">
             <a:extLst>
               <a:ext uri="{FF2B5EF4-FFF2-40B4-BE49-F238E27FC236}">
-                <a16:creationId xmlns:a16="http://schemas.microsoft.com/office/drawing/2014/main" id="{ED1634C0-8470-4BAC-AAA9-C1FE07ACD9D1}"/>
+                <a16:creationId xmlns:a16="http://schemas.microsoft.com/office/drawing/2014/main" xmlns="" id="{ED1634C0-8470-4BAC-AAA9-C1FE07ACD9D1}"/>
               </a:ext>
             </a:extLst>
           </p:cNvPr>
@@ -10973,7 +11065,7 @@
           <p:cNvPr id="18" name="Straight Connector 17">
             <a:extLst>
               <a:ext uri="{FF2B5EF4-FFF2-40B4-BE49-F238E27FC236}">
-                <a16:creationId xmlns:a16="http://schemas.microsoft.com/office/drawing/2014/main" id="{8D6B047D-62D2-4CAA-8745-150F5749442F}"/>
+                <a16:creationId xmlns:a16="http://schemas.microsoft.com/office/drawing/2014/main" xmlns="" id="{8D6B047D-62D2-4CAA-8745-150F5749442F}"/>
               </a:ext>
             </a:extLst>
           </p:cNvPr>
@@ -11014,7 +11106,7 @@
           <p:cNvPr id="19" name="Straight Connector 18">
             <a:extLst>
               <a:ext uri="{FF2B5EF4-FFF2-40B4-BE49-F238E27FC236}">
-                <a16:creationId xmlns:a16="http://schemas.microsoft.com/office/drawing/2014/main" id="{235E25EC-1775-4432-871D-C98242593FC5}"/>
+                <a16:creationId xmlns:a16="http://schemas.microsoft.com/office/drawing/2014/main" xmlns="" id="{235E25EC-1775-4432-871D-C98242593FC5}"/>
               </a:ext>
             </a:extLst>
           </p:cNvPr>
@@ -11055,7 +11147,7 @@
           <p:cNvPr id="20" name="Straight Connector 19">
             <a:extLst>
               <a:ext uri="{FF2B5EF4-FFF2-40B4-BE49-F238E27FC236}">
-                <a16:creationId xmlns:a16="http://schemas.microsoft.com/office/drawing/2014/main" id="{66934499-30D6-48A7-B1F7-E2236A6115D5}"/>
+                <a16:creationId xmlns:a16="http://schemas.microsoft.com/office/drawing/2014/main" xmlns="" id="{66934499-30D6-48A7-B1F7-E2236A6115D5}"/>
               </a:ext>
             </a:extLst>
           </p:cNvPr>
@@ -11096,7 +11188,7 @@
           <p:cNvPr id="21" name="Straight Connector 20">
             <a:extLst>
               <a:ext uri="{FF2B5EF4-FFF2-40B4-BE49-F238E27FC236}">
-                <a16:creationId xmlns:a16="http://schemas.microsoft.com/office/drawing/2014/main" id="{F43F6FFC-E9AF-4B60-9179-A908DD2E934C}"/>
+                <a16:creationId xmlns:a16="http://schemas.microsoft.com/office/drawing/2014/main" xmlns="" id="{F43F6FFC-E9AF-4B60-9179-A908DD2E934C}"/>
               </a:ext>
             </a:extLst>
           </p:cNvPr>
@@ -11137,7 +11229,7 @@
           <p:cNvPr id="22" name="Straight Connector 21">
             <a:extLst>
               <a:ext uri="{FF2B5EF4-FFF2-40B4-BE49-F238E27FC236}">
-                <a16:creationId xmlns:a16="http://schemas.microsoft.com/office/drawing/2014/main" id="{561A8249-1076-4FB9-A7C4-C3FB5ACCABF6}"/>
+                <a16:creationId xmlns:a16="http://schemas.microsoft.com/office/drawing/2014/main" xmlns="" id="{561A8249-1076-4FB9-A7C4-C3FB5ACCABF6}"/>
               </a:ext>
             </a:extLst>
           </p:cNvPr>
@@ -11178,7 +11270,7 @@
           <p:cNvPr id="23" name="Straight Connector 22">
             <a:extLst>
               <a:ext uri="{FF2B5EF4-FFF2-40B4-BE49-F238E27FC236}">
-                <a16:creationId xmlns:a16="http://schemas.microsoft.com/office/drawing/2014/main" id="{C301F0D3-DCBD-4DF8-9FB4-39A02A97EA59}"/>
+                <a16:creationId xmlns:a16="http://schemas.microsoft.com/office/drawing/2014/main" xmlns="" id="{C301F0D3-DCBD-4DF8-9FB4-39A02A97EA59}"/>
               </a:ext>
             </a:extLst>
           </p:cNvPr>
@@ -11219,7 +11311,7 @@
           <p:cNvPr id="24" name="Oval 23">
             <a:extLst>
               <a:ext uri="{FF2B5EF4-FFF2-40B4-BE49-F238E27FC236}">
-                <a16:creationId xmlns:a16="http://schemas.microsoft.com/office/drawing/2014/main" id="{D72AAC99-F01F-491C-92B7-26AD95DCAE99}"/>
+                <a16:creationId xmlns:a16="http://schemas.microsoft.com/office/drawing/2014/main" xmlns="" id="{D72AAC99-F01F-491C-92B7-26AD95DCAE99}"/>
               </a:ext>
             </a:extLst>
           </p:cNvPr>
@@ -11269,7 +11361,7 @@
           <p:cNvPr id="26" name="Oval 25">
             <a:extLst>
               <a:ext uri="{FF2B5EF4-FFF2-40B4-BE49-F238E27FC236}">
-                <a16:creationId xmlns:a16="http://schemas.microsoft.com/office/drawing/2014/main" id="{A9B4397F-885E-43C7-95BC-B2847D5E7513}"/>
+                <a16:creationId xmlns:a16="http://schemas.microsoft.com/office/drawing/2014/main" xmlns="" id="{A9B4397F-885E-43C7-95BC-B2847D5E7513}"/>
               </a:ext>
             </a:extLst>
           </p:cNvPr>
@@ -11349,7 +11441,7 @@
           <p:cNvPr id="2" name="Title 1">
             <a:extLst>
               <a:ext uri="{FF2B5EF4-FFF2-40B4-BE49-F238E27FC236}">
-                <a16:creationId xmlns:a16="http://schemas.microsoft.com/office/drawing/2014/main" id="{307B8968-DE91-425E-BD8D-741A296A1EE6}"/>
+                <a16:creationId xmlns:a16="http://schemas.microsoft.com/office/drawing/2014/main" xmlns="" id="{307B8968-DE91-425E-BD8D-741A296A1EE6}"/>
               </a:ext>
             </a:extLst>
           </p:cNvPr>
@@ -11382,7 +11474,7 @@
           <p:cNvPr id="4" name="Content Placeholder 3">
             <a:extLst>
               <a:ext uri="{FF2B5EF4-FFF2-40B4-BE49-F238E27FC236}">
-                <a16:creationId xmlns:a16="http://schemas.microsoft.com/office/drawing/2014/main" id="{253205ED-EB82-4F1F-AC4D-6CF6E3C2F5CC}"/>
+                <a16:creationId xmlns:a16="http://schemas.microsoft.com/office/drawing/2014/main" xmlns="" id="{253205ED-EB82-4F1F-AC4D-6CF6E3C2F5CC}"/>
               </a:ext>
             </a:extLst>
           </p:cNvPr>
@@ -11412,28 +11504,28 @@
                 <a:gridCol w="1993077">
                   <a:extLst>
                     <a:ext uri="{9D8B030D-6E8A-4147-A177-3AD203B41FA5}">
-                      <a16:colId xmlns:a16="http://schemas.microsoft.com/office/drawing/2014/main" val="1321865565"/>
+                      <a16:colId xmlns:a16="http://schemas.microsoft.com/office/drawing/2014/main" xmlns="" val="1321865565"/>
                     </a:ext>
                   </a:extLst>
                 </a:gridCol>
                 <a:gridCol w="2438308">
                   <a:extLst>
                     <a:ext uri="{9D8B030D-6E8A-4147-A177-3AD203B41FA5}">
-                      <a16:colId xmlns:a16="http://schemas.microsoft.com/office/drawing/2014/main" val="621221694"/>
+                      <a16:colId xmlns:a16="http://schemas.microsoft.com/office/drawing/2014/main" xmlns="" val="621221694"/>
                     </a:ext>
                   </a:extLst>
                 </a:gridCol>
                 <a:gridCol w="2714919">
                   <a:extLst>
                     <a:ext uri="{9D8B030D-6E8A-4147-A177-3AD203B41FA5}">
-                      <a16:colId xmlns:a16="http://schemas.microsoft.com/office/drawing/2014/main" val="618433142"/>
+                      <a16:colId xmlns:a16="http://schemas.microsoft.com/office/drawing/2014/main" xmlns="" val="618433142"/>
                     </a:ext>
                   </a:extLst>
                 </a:gridCol>
                 <a:gridCol w="3369295">
                   <a:extLst>
                     <a:ext uri="{9D8B030D-6E8A-4147-A177-3AD203B41FA5}">
-                      <a16:colId xmlns:a16="http://schemas.microsoft.com/office/drawing/2014/main" val="1187566209"/>
+                      <a16:colId xmlns:a16="http://schemas.microsoft.com/office/drawing/2014/main" xmlns="" val="1187566209"/>
                     </a:ext>
                   </a:extLst>
                 </a:gridCol>
@@ -11561,7 +11653,7 @@
                 </a:tc>
                 <a:extLst>
                   <a:ext uri="{0D108BD9-81ED-4DB2-BD59-A6C34878D82A}">
-                    <a16:rowId xmlns:a16="http://schemas.microsoft.com/office/drawing/2014/main" val="3472444932"/>
+                    <a16:rowId xmlns:a16="http://schemas.microsoft.com/office/drawing/2014/main" xmlns="" val="3472444932"/>
                   </a:ext>
                 </a:extLst>
               </a:tr>
@@ -11688,7 +11780,7 @@
                 </a:tc>
                 <a:extLst>
                   <a:ext uri="{0D108BD9-81ED-4DB2-BD59-A6C34878D82A}">
-                    <a16:rowId xmlns:a16="http://schemas.microsoft.com/office/drawing/2014/main" val="1592944227"/>
+                    <a16:rowId xmlns:a16="http://schemas.microsoft.com/office/drawing/2014/main" xmlns="" val="1592944227"/>
                   </a:ext>
                 </a:extLst>
               </a:tr>
@@ -11816,7 +11908,7 @@
                 </a:tc>
                 <a:extLst>
                   <a:ext uri="{0D108BD9-81ED-4DB2-BD59-A6C34878D82A}">
-                    <a16:rowId xmlns:a16="http://schemas.microsoft.com/office/drawing/2014/main" val="1793529964"/>
+                    <a16:rowId xmlns:a16="http://schemas.microsoft.com/office/drawing/2014/main" xmlns="" val="1793529964"/>
                   </a:ext>
                 </a:extLst>
               </a:tr>
@@ -11923,7 +12015,7 @@
                 </a:tc>
                 <a:extLst>
                   <a:ext uri="{0D108BD9-81ED-4DB2-BD59-A6C34878D82A}">
-                    <a16:rowId xmlns:a16="http://schemas.microsoft.com/office/drawing/2014/main" val="4202869693"/>
+                    <a16:rowId xmlns:a16="http://schemas.microsoft.com/office/drawing/2014/main" xmlns="" val="4202869693"/>
                   </a:ext>
                 </a:extLst>
               </a:tr>
@@ -12071,7 +12163,7 @@
                 </a:tc>
                 <a:extLst>
                   <a:ext uri="{0D108BD9-81ED-4DB2-BD59-A6C34878D82A}">
-                    <a16:rowId xmlns:a16="http://schemas.microsoft.com/office/drawing/2014/main" val="757473240"/>
+                    <a16:rowId xmlns:a16="http://schemas.microsoft.com/office/drawing/2014/main" xmlns="" val="757473240"/>
                   </a:ext>
                 </a:extLst>
               </a:tr>
@@ -12223,7 +12315,7 @@
                 </a:tc>
                 <a:extLst>
                   <a:ext uri="{0D108BD9-81ED-4DB2-BD59-A6C34878D82A}">
-                    <a16:rowId xmlns:a16="http://schemas.microsoft.com/office/drawing/2014/main" val="1023074434"/>
+                    <a16:rowId xmlns:a16="http://schemas.microsoft.com/office/drawing/2014/main" xmlns="" val="1023074434"/>
                   </a:ext>
                 </a:extLst>
               </a:tr>
@@ -12330,7 +12422,7 @@
                 </a:tc>
                 <a:extLst>
                   <a:ext uri="{0D108BD9-81ED-4DB2-BD59-A6C34878D82A}">
-                    <a16:rowId xmlns:a16="http://schemas.microsoft.com/office/drawing/2014/main" val="2982940022"/>
+                    <a16:rowId xmlns:a16="http://schemas.microsoft.com/office/drawing/2014/main" xmlns="" val="2982940022"/>
                   </a:ext>
                 </a:extLst>
               </a:tr>
@@ -12373,7 +12465,7 @@
           <p:cNvPr id="2" name="Title 1">
             <a:extLst>
               <a:ext uri="{FF2B5EF4-FFF2-40B4-BE49-F238E27FC236}">
-                <a16:creationId xmlns:a16="http://schemas.microsoft.com/office/drawing/2014/main" id="{E2C35651-2B8F-47E5-B2BF-DE42C7C25A44}"/>
+                <a16:creationId xmlns:a16="http://schemas.microsoft.com/office/drawing/2014/main" xmlns="" id="{E2C35651-2B8F-47E5-B2BF-DE42C7C25A44}"/>
               </a:ext>
             </a:extLst>
           </p:cNvPr>
@@ -12406,7 +12498,7 @@
           <p:cNvPr id="4" name="Content Placeholder 3">
             <a:extLst>
               <a:ext uri="{FF2B5EF4-FFF2-40B4-BE49-F238E27FC236}">
-                <a16:creationId xmlns:a16="http://schemas.microsoft.com/office/drawing/2014/main" id="{81CA707F-1731-4AF6-9910-EC1B6C4F2349}"/>
+                <a16:creationId xmlns:a16="http://schemas.microsoft.com/office/drawing/2014/main" xmlns="" id="{81CA707F-1731-4AF6-9910-EC1B6C4F2349}"/>
               </a:ext>
             </a:extLst>
           </p:cNvPr>
@@ -12438,7 +12530,7 @@
           <p:cNvPr id="5" name="Title 1">
             <a:extLst>
               <a:ext uri="{FF2B5EF4-FFF2-40B4-BE49-F238E27FC236}">
-                <a16:creationId xmlns:a16="http://schemas.microsoft.com/office/drawing/2014/main" id="{EAEA55F8-1AA8-452F-A614-E8535B9DBA53}"/>
+                <a16:creationId xmlns:a16="http://schemas.microsoft.com/office/drawing/2014/main" xmlns="" id="{EAEA55F8-1AA8-452F-A614-E8535B9DBA53}"/>
               </a:ext>
             </a:extLst>
           </p:cNvPr>
@@ -12492,7 +12584,7 @@
           <p:cNvPr id="6" name="Picture 5">
             <a:extLst>
               <a:ext uri="{FF2B5EF4-FFF2-40B4-BE49-F238E27FC236}">
-                <a16:creationId xmlns:a16="http://schemas.microsoft.com/office/drawing/2014/main" id="{3D2EDC6F-77EA-42AF-AA8B-73CA352AB050}"/>
+                <a16:creationId xmlns:a16="http://schemas.microsoft.com/office/drawing/2014/main" xmlns="" id="{3D2EDC6F-77EA-42AF-AA8B-73CA352AB050}"/>
               </a:ext>
             </a:extLst>
           </p:cNvPr>
@@ -12552,7 +12644,7 @@
           <p:cNvPr id="2" name="Title 1">
             <a:extLst>
               <a:ext uri="{FF2B5EF4-FFF2-40B4-BE49-F238E27FC236}">
-                <a16:creationId xmlns:a16="http://schemas.microsoft.com/office/drawing/2014/main" id="{E2C35651-2B8F-47E5-B2BF-DE42C7C25A44}"/>
+                <a16:creationId xmlns:a16="http://schemas.microsoft.com/office/drawing/2014/main" xmlns="" id="{E2C35651-2B8F-47E5-B2BF-DE42C7C25A44}"/>
               </a:ext>
             </a:extLst>
           </p:cNvPr>
@@ -12585,7 +12677,7 @@
           <p:cNvPr id="4" name="Content Placeholder 3">
             <a:extLst>
               <a:ext uri="{FF2B5EF4-FFF2-40B4-BE49-F238E27FC236}">
-                <a16:creationId xmlns:a16="http://schemas.microsoft.com/office/drawing/2014/main" id="{81CA707F-1731-4AF6-9910-EC1B6C4F2349}"/>
+                <a16:creationId xmlns:a16="http://schemas.microsoft.com/office/drawing/2014/main" xmlns="" id="{81CA707F-1731-4AF6-9910-EC1B6C4F2349}"/>
               </a:ext>
             </a:extLst>
           </p:cNvPr>
@@ -12617,7 +12709,7 @@
           <p:cNvPr id="5" name="Title 1">
             <a:extLst>
               <a:ext uri="{FF2B5EF4-FFF2-40B4-BE49-F238E27FC236}">
-                <a16:creationId xmlns:a16="http://schemas.microsoft.com/office/drawing/2014/main" id="{EAEA55F8-1AA8-452F-A614-E8535B9DBA53}"/>
+                <a16:creationId xmlns:a16="http://schemas.microsoft.com/office/drawing/2014/main" xmlns="" id="{EAEA55F8-1AA8-452F-A614-E8535B9DBA53}"/>
               </a:ext>
             </a:extLst>
           </p:cNvPr>
@@ -12671,7 +12763,7 @@
           <p:cNvPr id="6" name="Picture 5">
             <a:extLst>
               <a:ext uri="{FF2B5EF4-FFF2-40B4-BE49-F238E27FC236}">
-                <a16:creationId xmlns:a16="http://schemas.microsoft.com/office/drawing/2014/main" id="{3D2EDC6F-77EA-42AF-AA8B-73CA352AB050}"/>
+                <a16:creationId xmlns:a16="http://schemas.microsoft.com/office/drawing/2014/main" xmlns="" id="{3D2EDC6F-77EA-42AF-AA8B-73CA352AB050}"/>
               </a:ext>
             </a:extLst>
           </p:cNvPr>
@@ -12701,7 +12793,7 @@
           <p:cNvPr id="7" name="Rectangle 6">
             <a:extLst>
               <a:ext uri="{FF2B5EF4-FFF2-40B4-BE49-F238E27FC236}">
-                <a16:creationId xmlns:a16="http://schemas.microsoft.com/office/drawing/2014/main" id="{6C71EA6B-B2FB-439F-AD6D-FDBAE18F815A}"/>
+                <a16:creationId xmlns:a16="http://schemas.microsoft.com/office/drawing/2014/main" xmlns="" id="{6C71EA6B-B2FB-439F-AD6D-FDBAE18F815A}"/>
               </a:ext>
             </a:extLst>
           </p:cNvPr>
@@ -12783,7 +12875,7 @@
           <p:cNvPr id="2" name="Title 1">
             <a:extLst>
               <a:ext uri="{FF2B5EF4-FFF2-40B4-BE49-F238E27FC236}">
-                <a16:creationId xmlns:a16="http://schemas.microsoft.com/office/drawing/2014/main" id="{E2C35651-2B8F-47E5-B2BF-DE42C7C25A44}"/>
+                <a16:creationId xmlns:a16="http://schemas.microsoft.com/office/drawing/2014/main" xmlns="" id="{E2C35651-2B8F-47E5-B2BF-DE42C7C25A44}"/>
               </a:ext>
             </a:extLst>
           </p:cNvPr>
@@ -12822,7 +12914,7 @@
           <p:cNvPr id="6" name="Picture 5">
             <a:extLst>
               <a:ext uri="{FF2B5EF4-FFF2-40B4-BE49-F238E27FC236}">
-                <a16:creationId xmlns:a16="http://schemas.microsoft.com/office/drawing/2014/main" id="{D856841F-F801-4B38-9A6B-9FAE902EF12B}"/>
+                <a16:creationId xmlns:a16="http://schemas.microsoft.com/office/drawing/2014/main" xmlns="" id="{D856841F-F801-4B38-9A6B-9FAE902EF12B}"/>
               </a:ext>
             </a:extLst>
           </p:cNvPr>
@@ -12852,7 +12944,7 @@
           <p:cNvPr id="9" name="Content Placeholder 8">
             <a:extLst>
               <a:ext uri="{FF2B5EF4-FFF2-40B4-BE49-F238E27FC236}">
-                <a16:creationId xmlns:a16="http://schemas.microsoft.com/office/drawing/2014/main" id="{CC83BE1A-D31C-4B27-AE0F-61485F26C35E}"/>
+                <a16:creationId xmlns:a16="http://schemas.microsoft.com/office/drawing/2014/main" xmlns="" id="{CC83BE1A-D31C-4B27-AE0F-61485F26C35E}"/>
               </a:ext>
             </a:extLst>
           </p:cNvPr>
@@ -12914,7 +13006,7 @@
           <p:cNvPr id="2" name="Title 1">
             <a:extLst>
               <a:ext uri="{FF2B5EF4-FFF2-40B4-BE49-F238E27FC236}">
-                <a16:creationId xmlns:a16="http://schemas.microsoft.com/office/drawing/2014/main" id="{E2C35651-2B8F-47E5-B2BF-DE42C7C25A44}"/>
+                <a16:creationId xmlns:a16="http://schemas.microsoft.com/office/drawing/2014/main" xmlns="" id="{E2C35651-2B8F-47E5-B2BF-DE42C7C25A44}"/>
               </a:ext>
             </a:extLst>
           </p:cNvPr>
@@ -12953,7 +13045,7 @@
           <p:cNvPr id="6" name="Picture 5">
             <a:extLst>
               <a:ext uri="{FF2B5EF4-FFF2-40B4-BE49-F238E27FC236}">
-                <a16:creationId xmlns:a16="http://schemas.microsoft.com/office/drawing/2014/main" id="{D856841F-F801-4B38-9A6B-9FAE902EF12B}"/>
+                <a16:creationId xmlns:a16="http://schemas.microsoft.com/office/drawing/2014/main" xmlns="" id="{D856841F-F801-4B38-9A6B-9FAE902EF12B}"/>
               </a:ext>
             </a:extLst>
           </p:cNvPr>
@@ -12983,7 +13075,7 @@
           <p:cNvPr id="9" name="Content Placeholder 8">
             <a:extLst>
               <a:ext uri="{FF2B5EF4-FFF2-40B4-BE49-F238E27FC236}">
-                <a16:creationId xmlns:a16="http://schemas.microsoft.com/office/drawing/2014/main" id="{CC83BE1A-D31C-4B27-AE0F-61485F26C35E}"/>
+                <a16:creationId xmlns:a16="http://schemas.microsoft.com/office/drawing/2014/main" xmlns="" id="{CC83BE1A-D31C-4B27-AE0F-61485F26C35E}"/>
               </a:ext>
             </a:extLst>
           </p:cNvPr>
@@ -13015,7 +13107,7 @@
           <p:cNvPr id="10" name="Rectangle 9">
             <a:extLst>
               <a:ext uri="{FF2B5EF4-FFF2-40B4-BE49-F238E27FC236}">
-                <a16:creationId xmlns:a16="http://schemas.microsoft.com/office/drawing/2014/main" id="{FEA31F8D-7A89-4A16-AFA7-A8607888F3D6}"/>
+                <a16:creationId xmlns:a16="http://schemas.microsoft.com/office/drawing/2014/main" xmlns="" id="{FEA31F8D-7A89-4A16-AFA7-A8607888F3D6}"/>
               </a:ext>
             </a:extLst>
           </p:cNvPr>
@@ -13142,8 +13234,8 @@
           <a:lstStyle/>
           <a:p>
             <a:r>
-              <a:rPr lang="en-US" b="1" dirty="0"/>
-              <a:t>1.Introduction:</a:t>
+              <a:rPr lang="en-US" b="1" dirty="0" smtClean="0"/>
+              <a:t>1.Introduction</a:t>
             </a:r>
             <a:endParaRPr lang="en-GB" dirty="0"/>
           </a:p>
@@ -13190,14 +13282,14 @@
           <a:p>
             <a:r>
               <a:rPr lang="en-US" b="1" dirty="0"/>
-              <a:t>2.Project Approach :</a:t>
+              <a:t>2.Project Approach </a:t>
             </a:r>
             <a:endParaRPr lang="en-GB" dirty="0"/>
           </a:p>
           <a:p>
             <a:r>
               <a:rPr lang="en-US" b="1" dirty="0"/>
-              <a:t>3.Contributions :</a:t>
+              <a:t>3.Contributions </a:t>
             </a:r>
           </a:p>
           <a:p>
@@ -13209,12 +13301,16 @@
               <a:t>       3.1 </a:t>
             </a:r>
             <a:r>
-              <a:rPr lang="en-US" b="1" dirty="0" err="1"/>
-              <a:t>Immplemention</a:t>
+              <a:rPr lang="en-US" b="1" dirty="0" err="1" smtClean="0"/>
+              <a:t>Implemention</a:t>
+            </a:r>
+            <a:r>
+              <a:rPr lang="en-US" b="1" dirty="0" smtClean="0"/>
+              <a:t> </a:t>
             </a:r>
             <a:r>
               <a:rPr lang="en-US" b="1" dirty="0"/>
-              <a:t> steps</a:t>
+              <a:t>steps</a:t>
             </a:r>
             <a:endParaRPr lang="en-GB" dirty="0"/>
           </a:p>
@@ -13280,7 +13376,7 @@
           <p:cNvPr id="2" name="Title 1">
             <a:extLst>
               <a:ext uri="{FF2B5EF4-FFF2-40B4-BE49-F238E27FC236}">
-                <a16:creationId xmlns:a16="http://schemas.microsoft.com/office/drawing/2014/main" id="{E2C35651-2B8F-47E5-B2BF-DE42C7C25A44}"/>
+                <a16:creationId xmlns:a16="http://schemas.microsoft.com/office/drawing/2014/main" xmlns="" id="{E2C35651-2B8F-47E5-B2BF-DE42C7C25A44}"/>
               </a:ext>
             </a:extLst>
           </p:cNvPr>
@@ -13319,7 +13415,7 @@
           <p:cNvPr id="5" name="Content Placeholder 4">
             <a:extLst>
               <a:ext uri="{FF2B5EF4-FFF2-40B4-BE49-F238E27FC236}">
-                <a16:creationId xmlns:a16="http://schemas.microsoft.com/office/drawing/2014/main" id="{4D21444C-7955-4E8A-872A-7E43CFC5E737}"/>
+                <a16:creationId xmlns:a16="http://schemas.microsoft.com/office/drawing/2014/main" xmlns="" id="{4D21444C-7955-4E8A-872A-7E43CFC5E737}"/>
               </a:ext>
             </a:extLst>
           </p:cNvPr>
@@ -13351,7 +13447,7 @@
           <p:cNvPr id="7" name="Picture 6">
             <a:extLst>
               <a:ext uri="{FF2B5EF4-FFF2-40B4-BE49-F238E27FC236}">
-                <a16:creationId xmlns:a16="http://schemas.microsoft.com/office/drawing/2014/main" id="{3080F814-84F6-4B5E-91FD-4CF85EFAA2B6}"/>
+                <a16:creationId xmlns:a16="http://schemas.microsoft.com/office/drawing/2014/main" xmlns="" id="{3080F814-84F6-4B5E-91FD-4CF85EFAA2B6}"/>
               </a:ext>
             </a:extLst>
           </p:cNvPr>
@@ -13411,7 +13507,7 @@
           <p:cNvPr id="2" name="Title 1">
             <a:extLst>
               <a:ext uri="{FF2B5EF4-FFF2-40B4-BE49-F238E27FC236}">
-                <a16:creationId xmlns:a16="http://schemas.microsoft.com/office/drawing/2014/main" id="{E2C35651-2B8F-47E5-B2BF-DE42C7C25A44}"/>
+                <a16:creationId xmlns:a16="http://schemas.microsoft.com/office/drawing/2014/main" xmlns="" id="{E2C35651-2B8F-47E5-B2BF-DE42C7C25A44}"/>
               </a:ext>
             </a:extLst>
           </p:cNvPr>
@@ -13450,7 +13546,7 @@
           <p:cNvPr id="5" name="Content Placeholder 4">
             <a:extLst>
               <a:ext uri="{FF2B5EF4-FFF2-40B4-BE49-F238E27FC236}">
-                <a16:creationId xmlns:a16="http://schemas.microsoft.com/office/drawing/2014/main" id="{4D21444C-7955-4E8A-872A-7E43CFC5E737}"/>
+                <a16:creationId xmlns:a16="http://schemas.microsoft.com/office/drawing/2014/main" xmlns="" id="{4D21444C-7955-4E8A-872A-7E43CFC5E737}"/>
               </a:ext>
             </a:extLst>
           </p:cNvPr>
@@ -13482,7 +13578,7 @@
           <p:cNvPr id="7" name="Picture 6">
             <a:extLst>
               <a:ext uri="{FF2B5EF4-FFF2-40B4-BE49-F238E27FC236}">
-                <a16:creationId xmlns:a16="http://schemas.microsoft.com/office/drawing/2014/main" id="{3080F814-84F6-4B5E-91FD-4CF85EFAA2B6}"/>
+                <a16:creationId xmlns:a16="http://schemas.microsoft.com/office/drawing/2014/main" xmlns="" id="{3080F814-84F6-4B5E-91FD-4CF85EFAA2B6}"/>
               </a:ext>
             </a:extLst>
           </p:cNvPr>
@@ -13512,7 +13608,7 @@
           <p:cNvPr id="10" name="Rectangle 9">
             <a:extLst>
               <a:ext uri="{FF2B5EF4-FFF2-40B4-BE49-F238E27FC236}">
-                <a16:creationId xmlns:a16="http://schemas.microsoft.com/office/drawing/2014/main" id="{FEA31F8D-7A89-4A16-AFA7-A8607888F3D6}"/>
+                <a16:creationId xmlns:a16="http://schemas.microsoft.com/office/drawing/2014/main" xmlns="" id="{FEA31F8D-7A89-4A16-AFA7-A8607888F3D6}"/>
               </a:ext>
             </a:extLst>
           </p:cNvPr>
@@ -13594,7 +13690,7 @@
           <p:cNvPr id="2" name="Title 1">
             <a:extLst>
               <a:ext uri="{FF2B5EF4-FFF2-40B4-BE49-F238E27FC236}">
-                <a16:creationId xmlns:a16="http://schemas.microsoft.com/office/drawing/2014/main" id="{2890EE67-F959-46EC-93C0-4DC44E2BBE90}"/>
+                <a16:creationId xmlns:a16="http://schemas.microsoft.com/office/drawing/2014/main" xmlns="" id="{2890EE67-F959-46EC-93C0-4DC44E2BBE90}"/>
               </a:ext>
             </a:extLst>
           </p:cNvPr>
@@ -13628,7 +13724,7 @@
           <p:cNvPr id="3" name="Content Placeholder 2">
             <a:extLst>
               <a:ext uri="{FF2B5EF4-FFF2-40B4-BE49-F238E27FC236}">
-                <a16:creationId xmlns:a16="http://schemas.microsoft.com/office/drawing/2014/main" id="{A4039225-E4C6-4F69-A0F2-C27BA667DEF5}"/>
+                <a16:creationId xmlns:a16="http://schemas.microsoft.com/office/drawing/2014/main" xmlns="" id="{A4039225-E4C6-4F69-A0F2-C27BA667DEF5}"/>
               </a:ext>
             </a:extLst>
           </p:cNvPr>
@@ -14015,15 +14111,81 @@
           <a:p>
             <a:r>
               <a:rPr lang="en-US" dirty="0"/>
-              <a:t>This project aims to analyze and predict students’ academic performance. The Mining of students’ interaction performance of education is an emerging field of application of data mining. </a:t>
-            </a:r>
-          </a:p>
-          <a:p>
+              <a:t>This project aims to analyze and predict students’ academic performance. The </a:t>
+            </a:r>
+            <a:r>
+              <a:rPr lang="en-US" dirty="0" smtClean="0"/>
+              <a:t>mining </a:t>
+            </a:r>
             <a:r>
               <a:rPr lang="en-US" dirty="0"/>
-              <a:t>Because it may allow to identify early on struggling students with different topics in where students experienced difficulties, or on those students who are more likely to fail in the examination prior to the examination etc. </a:t>
-            </a:r>
-            <a:endParaRPr lang="en-GB" dirty="0"/>
+              <a:t>of students’ interaction </a:t>
+            </a:r>
+            <a:r>
+              <a:rPr lang="en-US" dirty="0" smtClean="0"/>
+              <a:t>&amp; performance in educational settings </a:t>
+            </a:r>
+            <a:r>
+              <a:rPr lang="en-US" dirty="0"/>
+              <a:t>is an emerging field of application of data mining</a:t>
+            </a:r>
+            <a:r>
+              <a:rPr lang="en-US" dirty="0" smtClean="0"/>
+              <a:t>.</a:t>
+            </a:r>
+          </a:p>
+          <a:p>
+            <a:endParaRPr lang="en-US" dirty="0"/>
+          </a:p>
+          <a:p>
+            <a:r>
+              <a:rPr lang="en-US" dirty="0" smtClean="0"/>
+              <a:t>The mining of such data </a:t>
+            </a:r>
+            <a:r>
+              <a:rPr lang="en-US" dirty="0"/>
+              <a:t>allows </a:t>
+            </a:r>
+            <a:r>
+              <a:rPr lang="en-US" dirty="0" smtClean="0"/>
+              <a:t>early </a:t>
+            </a:r>
+            <a:r>
+              <a:rPr lang="en-US" dirty="0"/>
+              <a:t>identification of :</a:t>
+            </a:r>
+            <a:endParaRPr lang="en-US" dirty="0" smtClean="0"/>
+          </a:p>
+          <a:p>
+            <a:pPr lvl="1"/>
+            <a:r>
+              <a:rPr lang="en-US" sz="2800" dirty="0" smtClean="0"/>
+              <a:t>students </a:t>
+            </a:r>
+            <a:r>
+              <a:rPr lang="en-US" sz="2800" dirty="0"/>
+              <a:t>struggling with </a:t>
+            </a:r>
+            <a:r>
+              <a:rPr lang="en-US" sz="2800" dirty="0" smtClean="0"/>
+              <a:t>specific subjects/educational styles (interactions)</a:t>
+            </a:r>
+          </a:p>
+          <a:p>
+            <a:pPr lvl="1"/>
+            <a:r>
+              <a:rPr lang="en-US" sz="2800" dirty="0" smtClean="0"/>
+              <a:t>students </a:t>
+            </a:r>
+            <a:r>
+              <a:rPr lang="en-US" sz="2800" dirty="0"/>
+              <a:t>who are more likely to fail </a:t>
+            </a:r>
+            <a:r>
+              <a:rPr lang="en-US" sz="2800" dirty="0" smtClean="0"/>
+              <a:t>the subject/examination</a:t>
+            </a:r>
+            <a:endParaRPr lang="en-GB" sz="2800" dirty="0"/>
           </a:p>
         </p:txBody>
       </p:sp>
@@ -14109,19 +14271,98 @@
           <a:p>
             <a:r>
               <a:rPr lang="en-US" dirty="0"/>
-              <a:t>Examination plays a vital role in any student's life. The marks obtained by students in the examination affect their study and career life, especially in this competitive modern society. Therefore, it becomes essential to predict whether the student will pass or fail in the examination. </a:t>
-            </a:r>
-          </a:p>
-          <a:p>
+              <a:t>Examination plays a vital role in any student's life. The marks obtained by students in the examination affect their study and career life, especially in this competitive modern society. </a:t>
+            </a:r>
+            <a:endParaRPr lang="en-US" dirty="0" smtClean="0"/>
+          </a:p>
+          <a:p>
+            <a:endParaRPr lang="en-US" dirty="0" smtClean="0"/>
+          </a:p>
+          <a:p>
+            <a:r>
+              <a:rPr lang="en-US" dirty="0" smtClean="0"/>
+              <a:t>Predicting </a:t>
+            </a:r>
             <a:r>
               <a:rPr lang="en-US" dirty="0"/>
-              <a:t>If the prediction says that a student tends to fail in the examination prior to the examination then extra efforts can be taken to improve his studies and help him to pass the examination.</a:t>
-            </a:r>
-          </a:p>
-          <a:p>
+              <a:t>whether </a:t>
+            </a:r>
+            <a:r>
+              <a:rPr lang="en-US" dirty="0" smtClean="0"/>
+              <a:t>students </a:t>
+            </a:r>
             <a:r>
               <a:rPr lang="en-US" dirty="0"/>
-              <a:t>Not only will it benefit the students, but also for schools and parents. </a:t>
+              <a:t>will pass or fail </a:t>
+            </a:r>
+            <a:r>
+              <a:rPr lang="en-US" dirty="0" smtClean="0"/>
+              <a:t>an examination</a:t>
+            </a:r>
+            <a:r>
+              <a:rPr lang="en-US" dirty="0"/>
+              <a:t> </a:t>
+            </a:r>
+            <a:r>
+              <a:rPr lang="en-US" dirty="0" smtClean="0"/>
+              <a:t>prior to the examination itself allows to devote </a:t>
+            </a:r>
+            <a:r>
+              <a:rPr lang="en-US" dirty="0" smtClean="0"/>
+              <a:t>extra </a:t>
+            </a:r>
+            <a:r>
+              <a:rPr lang="en-US" dirty="0"/>
+              <a:t>efforts </a:t>
+            </a:r>
+            <a:r>
+              <a:rPr lang="en-US" dirty="0" smtClean="0"/>
+              <a:t>to </a:t>
+            </a:r>
+            <a:r>
+              <a:rPr lang="en-US" dirty="0"/>
+              <a:t>improve </a:t>
+            </a:r>
+            <a:r>
+              <a:rPr lang="en-US" dirty="0" smtClean="0"/>
+              <a:t>their studies </a:t>
+            </a:r>
+            <a:r>
+              <a:rPr lang="en-US" dirty="0"/>
+              <a:t>and help </a:t>
+            </a:r>
+            <a:r>
+              <a:rPr lang="en-US" dirty="0" smtClean="0"/>
+              <a:t>them to </a:t>
+            </a:r>
+            <a:r>
+              <a:rPr lang="en-US" dirty="0"/>
+              <a:t>pass the examination</a:t>
+            </a:r>
+            <a:r>
+              <a:rPr lang="en-US" dirty="0" smtClean="0"/>
+              <a:t>.</a:t>
+            </a:r>
+          </a:p>
+          <a:p>
+            <a:endParaRPr lang="en-US" dirty="0"/>
+          </a:p>
+          <a:p>
+            <a:r>
+              <a:rPr lang="en-US" dirty="0" smtClean="0"/>
+              <a:t>This will not only benefit </a:t>
+            </a:r>
+            <a:r>
+              <a:rPr lang="en-US" dirty="0"/>
+              <a:t>the students, but also </a:t>
+            </a:r>
+            <a:r>
+              <a:rPr lang="en-US" dirty="0" smtClean="0"/>
+              <a:t>the schools </a:t>
+            </a:r>
+            <a:r>
+              <a:rPr lang="en-US" dirty="0"/>
+              <a:t>and parents. </a:t>
             </a:r>
             <a:endParaRPr lang="en-GB" dirty="0"/>
           </a:p>
@@ -14203,16 +14444,61 @@
           <a:p>
             <a:r>
               <a:rPr lang="en-US" dirty="0"/>
-              <a:t>We make prediction of students’ academic performance based on the educational datasets.</a:t>
-            </a:r>
-          </a:p>
-          <a:p>
+              <a:t>We </a:t>
+            </a:r>
+            <a:r>
+              <a:rPr lang="en-US" dirty="0" smtClean="0"/>
+              <a:t>predict </a:t>
+            </a:r>
+            <a:r>
+              <a:rPr lang="en-US" dirty="0"/>
+              <a:t>students’ academic performance based </a:t>
+            </a:r>
+            <a:r>
+              <a:rPr lang="en-US" dirty="0" smtClean="0"/>
+              <a:t>on interactions and data recorded in an </a:t>
+            </a:r>
+            <a:r>
+              <a:rPr lang="en-US" dirty="0"/>
+              <a:t>educational </a:t>
+            </a:r>
+            <a:r>
+              <a:rPr lang="en-US" dirty="0" smtClean="0"/>
+              <a:t>dataset.</a:t>
+            </a:r>
             <a:endParaRPr lang="en-US" dirty="0"/>
           </a:p>
           <a:p>
+            <a:endParaRPr lang="en-US" dirty="0"/>
+          </a:p>
+          <a:p>
             <a:r>
               <a:rPr lang="en-US" dirty="0"/>
-              <a:t>Identify the which features in this dataset affects the students’ academic performance the most.</a:t>
+              <a:t>Identify </a:t>
+            </a:r>
+            <a:r>
+              <a:rPr lang="en-US" dirty="0" smtClean="0"/>
+              <a:t>which </a:t>
+            </a:r>
+            <a:r>
+              <a:rPr lang="en-US" dirty="0"/>
+              <a:t>features in this dataset </a:t>
+            </a:r>
+            <a:r>
+              <a:rPr lang="en-US" dirty="0" smtClean="0"/>
+              <a:t>affect </a:t>
+            </a:r>
+            <a:r>
+              <a:rPr lang="en-US" dirty="0"/>
+              <a:t>the students’ academic performance </a:t>
+            </a:r>
+            <a:r>
+              <a:rPr lang="en-US" dirty="0" smtClean="0"/>
+              <a:t>most</a:t>
+            </a:r>
+            <a:r>
+              <a:rPr lang="en-US" dirty="0"/>
+              <a:t>.</a:t>
             </a:r>
           </a:p>
           <a:p>
@@ -14224,7 +14510,39 @@
           <a:p>
             <a:r>
               <a:rPr lang="en-US" dirty="0"/>
-              <a:t>The datasets used in this project is just a sample, we can use the same method to analyze all kinds of educational performance to suit all kinds of students in different grade levels, gender, nationality, and even suitable for university student.</a:t>
+              <a:t>The </a:t>
+            </a:r>
+            <a:r>
+              <a:rPr lang="en-US" dirty="0" smtClean="0"/>
+              <a:t>methods developed </a:t>
+            </a:r>
+            <a:r>
+              <a:rPr lang="en-US" dirty="0" smtClean="0"/>
+              <a:t>in this project </a:t>
+            </a:r>
+            <a:r>
+              <a:rPr lang="en-US" dirty="0" smtClean="0"/>
+              <a:t>could be extended to </a:t>
+            </a:r>
+            <a:r>
+              <a:rPr lang="en-US" dirty="0"/>
+              <a:t>analyze all kinds of educational performance to suit all kinds of students in different grade levels, gender, nationality, </a:t>
+            </a:r>
+            <a:r>
+              <a:rPr lang="en-US" dirty="0" smtClean="0"/>
+              <a:t>and it may </a:t>
+            </a:r>
+            <a:r>
+              <a:rPr lang="en-US" dirty="0"/>
+              <a:t>even </a:t>
+            </a:r>
+            <a:r>
+              <a:rPr lang="en-US" dirty="0" smtClean="0"/>
+              <a:t>be suitable </a:t>
+            </a:r>
+            <a:r>
+              <a:rPr lang="en-US" dirty="0"/>
+              <a:t>for university student.</a:t>
             </a:r>
             <a:endParaRPr lang="en-GB" dirty="0"/>
           </a:p>
@@ -14321,7 +14639,15 @@
             </a:pPr>
             <a:r>
               <a:rPr lang="en-US" dirty="0"/>
-              <a:t>There will be 2 main types of deliverables in this study:</a:t>
+              <a:t>There </a:t>
+            </a:r>
+            <a:r>
+              <a:rPr lang="en-US" dirty="0" smtClean="0"/>
+              <a:t>are </a:t>
+            </a:r>
+            <a:r>
+              <a:rPr lang="en-US" dirty="0"/>
+              <a:t>2 main types of deliverables in this study:</a:t>
             </a:r>
           </a:p>
           <a:p>
@@ -14351,15 +14677,43 @@
           <a:p>
             <a:r>
               <a:rPr lang="en-US" dirty="0"/>
-              <a:t>2. One single zip archive folder which contains the following files in this study:</a:t>
-            </a:r>
-            <a:r>
-              <a:rPr lang="en-GB" dirty="0"/>
+              <a:t>2. One single zip archive folder which contains the </a:t>
+            </a:r>
+            <a:r>
+              <a:rPr lang="en-US" dirty="0" smtClean="0"/>
+              <a:t>following:</a:t>
+            </a:r>
+            <a:r>
+              <a:rPr lang="en-GB" dirty="0" smtClean="0"/>
               <a:t> </a:t>
             </a:r>
             <a:r>
               <a:rPr lang="de-DE" dirty="0"/>
-              <a:t>Rmarkdown file, Rmarkdown in PDf and HTML format, and the student’s academic performance dataset.</a:t>
+              <a:t>Rmarkdown file, </a:t>
+            </a:r>
+            <a:r>
+              <a:rPr lang="de-DE" dirty="0" err="1"/>
+              <a:t>Rmarkdown</a:t>
+            </a:r>
+            <a:r>
+              <a:rPr lang="de-DE" dirty="0"/>
+              <a:t> </a:t>
+            </a:r>
+            <a:r>
+              <a:rPr lang="de-DE" dirty="0" smtClean="0"/>
+              <a:t>PDF </a:t>
+            </a:r>
+            <a:r>
+              <a:rPr lang="de-DE" dirty="0" err="1" smtClean="0"/>
+              <a:t>and</a:t>
+            </a:r>
+            <a:r>
+              <a:rPr lang="de-DE" dirty="0" smtClean="0"/>
+              <a:t> HTML, </a:t>
+            </a:r>
+            <a:r>
+              <a:rPr lang="de-DE" dirty="0"/>
+              <a:t>and the student’s academic performance dataset.</a:t>
             </a:r>
             <a:endParaRPr lang="en-GB" dirty="0"/>
           </a:p>
@@ -14400,7 +14754,7 @@
           <p:cNvPr id="2" name="Title 1">
             <a:extLst>
               <a:ext uri="{FF2B5EF4-FFF2-40B4-BE49-F238E27FC236}">
-                <a16:creationId xmlns:a16="http://schemas.microsoft.com/office/drawing/2014/main" id="{1A898971-19AF-4A8B-9D15-CD5A1AEA1C68}"/>
+                <a16:creationId xmlns:a16="http://schemas.microsoft.com/office/drawing/2014/main" xmlns="" id="{1A898971-19AF-4A8B-9D15-CD5A1AEA1C68}"/>
               </a:ext>
             </a:extLst>
           </p:cNvPr>
@@ -14436,7 +14790,7 @@
           <p:cNvPr id="3" name="Content Placeholder 2">
             <a:extLst>
               <a:ext uri="{FF2B5EF4-FFF2-40B4-BE49-F238E27FC236}">
-                <a16:creationId xmlns:a16="http://schemas.microsoft.com/office/drawing/2014/main" id="{6690DA6D-FA84-46DD-A712-CC84EFBD1ACA}"/>
+                <a16:creationId xmlns:a16="http://schemas.microsoft.com/office/drawing/2014/main" xmlns="" id="{6690DA6D-FA84-46DD-A712-CC84EFBD1ACA}"/>
               </a:ext>
             </a:extLst>
           </p:cNvPr>
@@ -14556,7 +14910,7 @@
           <p:cNvPr id="2" name="Title 1">
             <a:extLst>
               <a:ext uri="{FF2B5EF4-FFF2-40B4-BE49-F238E27FC236}">
-                <a16:creationId xmlns:a16="http://schemas.microsoft.com/office/drawing/2014/main" id="{E46FF1C7-4944-4D09-B922-92B6E10E228C}"/>
+                <a16:creationId xmlns:a16="http://schemas.microsoft.com/office/drawing/2014/main" xmlns="" id="{E46FF1C7-4944-4D09-B922-92B6E10E228C}"/>
               </a:ext>
             </a:extLst>
           </p:cNvPr>
@@ -14591,7 +14945,7 @@
           <p:cNvPr id="4" name="Content Placeholder 3">
             <a:extLst>
               <a:ext uri="{FF2B5EF4-FFF2-40B4-BE49-F238E27FC236}">
-                <a16:creationId xmlns:a16="http://schemas.microsoft.com/office/drawing/2014/main" id="{98834587-E421-4A57-B5CB-031E9C2B4B70}"/>
+                <a16:creationId xmlns:a16="http://schemas.microsoft.com/office/drawing/2014/main" xmlns="" id="{98834587-E421-4A57-B5CB-031E9C2B4B70}"/>
               </a:ext>
             </a:extLst>
           </p:cNvPr>

</xml_diff>